<commit_message>
update for mt pre
</commit_message>
<xml_diff>
--- a/DATA1030 Midterm Presentation.pptx
+++ b/DATA1030 Midterm Presentation.pptx
@@ -124,7 +124,7 @@
             <a:srgbClr val="A4A3A4"/>
           </p15:clr>
         </p15:guide>
-        <p15:guide id="2" pos="3840">
+        <p15:guide id="2" pos="3863" userDrawn="1">
           <p15:clr>
             <a:srgbClr val="A4A3A4"/>
           </p15:clr>
@@ -217,7 +217,7 @@
           <a:p>
             <a:fld id="{89193B68-2286-124E-B70B-F14C32E46BD9}" type="datetimeFigureOut">
               <a:rPr kumimoji="1" lang="zh-CN" altLang="en-US" smtClean="0"/>
-              <a:t>2024/10/18</a:t>
+              <a:t>2024/10/20</a:t>
             </a:fld>
             <a:endParaRPr kumimoji="1" lang="zh-CN" altLang="en-US"/>
           </a:p>
@@ -528,6 +528,18 @@
           <a:bodyPr/>
           <a:lstStyle/>
           <a:p>
+            <a:r>
+              <a:rPr lang="en-US" altLang="zh-CN" dirty="0"/>
+              <a:t>Hello everyone, my name is </a:t>
+            </a:r>
+            <a:r>
+              <a:rPr lang="en-US" altLang="zh-CN" dirty="0" err="1"/>
+              <a:t>Kejing</a:t>
+            </a:r>
+            <a:r>
+              <a:rPr lang="en-US" altLang="zh-CN" dirty="0"/>
+              <a:t> Yan, and today I'll be presenting my work on analyzing key resume attributes that impact job callbacks. The objective of this project was to uncover the attributes that most influence whether or not a candidate receives a callback for a job interview.</a:t>
+            </a:r>
             <a:endParaRPr kumimoji="1" lang="zh-CN" altLang="en-US" dirty="0"/>
           </a:p>
         </p:txBody>
@@ -549,7 +561,7 @@
           <a:p>
             <a:fld id="{8AC3DE86-1BAE-4742-82A7-E109ACB8EC62}" type="slidenum">
               <a:rPr kumimoji="1" lang="zh-CN" altLang="en-US" smtClean="0"/>
-              <a:t>5</a:t>
+              <a:t>1</a:t>
             </a:fld>
             <a:endParaRPr kumimoji="1" lang="zh-CN" altLang="en-US"/>
           </a:p>
@@ -558,7 +570,7 @@
     </p:spTree>
     <p:extLst>
       <p:ext uri="{BB962C8B-B14F-4D97-AF65-F5344CB8AC3E}">
-        <p14:creationId xmlns:p14="http://schemas.microsoft.com/office/powerpoint/2010/main" val="60421913"/>
+        <p14:creationId xmlns:p14="http://schemas.microsoft.com/office/powerpoint/2010/main" val="2737819565"/>
       </p:ext>
     </p:extLst>
   </p:cSld>
@@ -612,6 +624,591 @@
           <a:bodyPr/>
           <a:lstStyle/>
           <a:p>
+            <a:r>
+              <a:rPr lang="en-US" altLang="zh-CN" dirty="0"/>
+              <a:t>Our goal in this project was to determine what resume attributes drive job callbacks. </a:t>
+            </a:r>
+          </a:p>
+          <a:p>
+            <a:endParaRPr lang="en-US" altLang="zh-CN" dirty="0"/>
+          </a:p>
+          <a:p>
+            <a:r>
+              <a:rPr lang="en-US" altLang="zh-CN" dirty="0"/>
+              <a:t>So about why is this important? In the job market, it‘s crucial for candidates to know which elements of their resumes are most impactful. Additionally, understanding these factors can help address potential biases in hiring practices, and help improving fairness and transparency in hiring processes. </a:t>
+            </a:r>
+          </a:p>
+          <a:p>
+            <a:endParaRPr lang="en-US" altLang="zh-CN" dirty="0"/>
+          </a:p>
+          <a:p>
+            <a:r>
+              <a:rPr lang="en-US" altLang="zh-CN" dirty="0"/>
+              <a:t>This project focuses on a binary classification problem, where we predict whether a candidate will receive a callback (1) or not (0).</a:t>
+            </a:r>
+          </a:p>
+          <a:p>
+            <a:endParaRPr lang="en-US" altLang="zh-CN" dirty="0"/>
+          </a:p>
+          <a:p>
+            <a:r>
+              <a:rPr lang="en-US" altLang="zh-CN" dirty="0"/>
+              <a:t>The data comes from Kaggle, a dataset that explores various resume and job attributes like education, experience, and skills. The data was collected from real-world job postings and candidate applications, making it highly relevant for our analysis</a:t>
+            </a:r>
+          </a:p>
+          <a:p>
+            <a:endParaRPr kumimoji="1" lang="zh-CN" altLang="en-US" dirty="0"/>
+          </a:p>
+        </p:txBody>
+      </p:sp>
+      <p:sp>
+        <p:nvSpPr>
+          <p:cNvPr id="4" name="灯片编号占位符 3"/>
+          <p:cNvSpPr>
+            <a:spLocks noGrp="1"/>
+          </p:cNvSpPr>
+          <p:nvPr>
+            <p:ph type="sldNum" sz="quarter" idx="5"/>
+          </p:nvPr>
+        </p:nvSpPr>
+        <p:spPr/>
+        <p:txBody>
+          <a:bodyPr/>
+          <a:lstStyle/>
+          <a:p>
+            <a:fld id="{8AC3DE86-1BAE-4742-82A7-E109ACB8EC62}" type="slidenum">
+              <a:rPr kumimoji="1" lang="zh-CN" altLang="en-US" smtClean="0"/>
+              <a:t>2</a:t>
+            </a:fld>
+            <a:endParaRPr kumimoji="1" lang="zh-CN" altLang="en-US"/>
+          </a:p>
+        </p:txBody>
+      </p:sp>
+    </p:spTree>
+    <p:extLst>
+      <p:ext uri="{BB962C8B-B14F-4D97-AF65-F5344CB8AC3E}">
+        <p14:creationId xmlns:p14="http://schemas.microsoft.com/office/powerpoint/2010/main" val="1472246959"/>
+      </p:ext>
+    </p:extLst>
+  </p:cSld>
+  <p:clrMapOvr>
+    <a:masterClrMapping/>
+  </p:clrMapOvr>
+</p:notes>
+</file>
+
+<file path=ppt/notesSlides/notesSlide3.xml><?xml version="1.0" encoding="utf-8"?>
+<p:notes xmlns:a="http://schemas.openxmlformats.org/drawingml/2006/main" xmlns:r="http://schemas.openxmlformats.org/officeDocument/2006/relationships" xmlns:p="http://schemas.openxmlformats.org/presentationml/2006/main">
+  <p:cSld>
+    <p:spTree>
+      <p:nvGrpSpPr>
+        <p:cNvPr id="1" name=""/>
+        <p:cNvGrpSpPr/>
+        <p:nvPr/>
+      </p:nvGrpSpPr>
+      <p:grpSpPr>
+        <a:xfrm>
+          <a:off x="0" y="0"/>
+          <a:ext cx="0" cy="0"/>
+          <a:chOff x="0" y="0"/>
+          <a:chExt cx="0" cy="0"/>
+        </a:xfrm>
+      </p:grpSpPr>
+      <p:sp>
+        <p:nvSpPr>
+          <p:cNvPr id="2" name="幻灯片图像占位符 1"/>
+          <p:cNvSpPr>
+            <a:spLocks noGrp="1" noRot="1" noChangeAspect="1"/>
+          </p:cNvSpPr>
+          <p:nvPr>
+            <p:ph type="sldImg"/>
+          </p:nvPr>
+        </p:nvSpPr>
+        <p:spPr/>
+      </p:sp>
+      <p:sp>
+        <p:nvSpPr>
+          <p:cNvPr id="3" name="备注占位符 2"/>
+          <p:cNvSpPr>
+            <a:spLocks noGrp="1"/>
+          </p:cNvSpPr>
+          <p:nvPr>
+            <p:ph type="body" idx="1"/>
+          </p:nvPr>
+        </p:nvSpPr>
+        <p:spPr/>
+        <p:txBody>
+          <a:bodyPr/>
+          <a:lstStyle/>
+          <a:p>
+            <a:r>
+              <a:rPr lang="en-US" altLang="zh-CN" dirty="0"/>
+              <a:t>This heatmap shows the callback rate by job city and job type. One interesting insight is that Boston consistently shows higher callback rates across most job types, except for 'Sales Rep,' where Chicago outperforms Boston. This might suggest that the location of the job impacts callback rates, potentially due to different industry demands in these cities.</a:t>
+            </a:r>
+            <a:endParaRPr kumimoji="1" lang="zh-CN" altLang="en-US" dirty="0"/>
+          </a:p>
+        </p:txBody>
+      </p:sp>
+      <p:sp>
+        <p:nvSpPr>
+          <p:cNvPr id="4" name="灯片编号占位符 3"/>
+          <p:cNvSpPr>
+            <a:spLocks noGrp="1"/>
+          </p:cNvSpPr>
+          <p:nvPr>
+            <p:ph type="sldNum" sz="quarter" idx="5"/>
+          </p:nvPr>
+        </p:nvSpPr>
+        <p:spPr/>
+        <p:txBody>
+          <a:bodyPr/>
+          <a:lstStyle/>
+          <a:p>
+            <a:fld id="{8AC3DE86-1BAE-4742-82A7-E109ACB8EC62}" type="slidenum">
+              <a:rPr kumimoji="1" lang="zh-CN" altLang="en-US" smtClean="0"/>
+              <a:t>3</a:t>
+            </a:fld>
+            <a:endParaRPr kumimoji="1" lang="zh-CN" altLang="en-US"/>
+          </a:p>
+        </p:txBody>
+      </p:sp>
+    </p:spTree>
+    <p:extLst>
+      <p:ext uri="{BB962C8B-B14F-4D97-AF65-F5344CB8AC3E}">
+        <p14:creationId xmlns:p14="http://schemas.microsoft.com/office/powerpoint/2010/main" val="1584467785"/>
+      </p:ext>
+    </p:extLst>
+  </p:cSld>
+  <p:clrMapOvr>
+    <a:masterClrMapping/>
+  </p:clrMapOvr>
+</p:notes>
+</file>
+
+<file path=ppt/notesSlides/notesSlide4.xml><?xml version="1.0" encoding="utf-8"?>
+<p:notes xmlns:a="http://schemas.openxmlformats.org/drawingml/2006/main" xmlns:r="http://schemas.openxmlformats.org/officeDocument/2006/relationships" xmlns:p="http://schemas.openxmlformats.org/presentationml/2006/main">
+  <p:cSld>
+    <p:spTree>
+      <p:nvGrpSpPr>
+        <p:cNvPr id="1" name=""/>
+        <p:cNvGrpSpPr/>
+        <p:nvPr/>
+      </p:nvGrpSpPr>
+      <p:grpSpPr>
+        <a:xfrm>
+          <a:off x="0" y="0"/>
+          <a:ext cx="0" cy="0"/>
+          <a:chOff x="0" y="0"/>
+          <a:chExt cx="0" cy="0"/>
+        </a:xfrm>
+      </p:grpSpPr>
+      <p:sp>
+        <p:nvSpPr>
+          <p:cNvPr id="2" name="幻灯片图像占位符 1"/>
+          <p:cNvSpPr>
+            <a:spLocks noGrp="1" noRot="1" noChangeAspect="1"/>
+          </p:cNvSpPr>
+          <p:nvPr>
+            <p:ph type="sldImg"/>
+          </p:nvPr>
+        </p:nvSpPr>
+        <p:spPr/>
+      </p:sp>
+      <p:sp>
+        <p:nvSpPr>
+          <p:cNvPr id="3" name="备注占位符 2"/>
+          <p:cNvSpPr>
+            <a:spLocks noGrp="1"/>
+          </p:cNvSpPr>
+          <p:nvPr>
+            <p:ph type="body" idx="1"/>
+          </p:nvPr>
+        </p:nvSpPr>
+        <p:spPr/>
+        <p:txBody>
+          <a:bodyPr/>
+          <a:lstStyle/>
+          <a:p>
+            <a:r>
+              <a:rPr lang="en-US" altLang="zh-CN" dirty="0"/>
+              <a:t>Next, we examined the relationship between years of college experience and callback rate. The histogram here reveals that candidates with two years of college experience had the highest callback rate, which was quite surprising. Even more unexpected was that those with four years of college had a lower callback rate. This suggests that a degree might not always be necessary to secure an interview, and that candidates with less formal education can still perform well.</a:t>
+            </a:r>
+            <a:endParaRPr kumimoji="1" lang="zh-CN" altLang="en-US" dirty="0"/>
+          </a:p>
+        </p:txBody>
+      </p:sp>
+      <p:sp>
+        <p:nvSpPr>
+          <p:cNvPr id="4" name="灯片编号占位符 3"/>
+          <p:cNvSpPr>
+            <a:spLocks noGrp="1"/>
+          </p:cNvSpPr>
+          <p:nvPr>
+            <p:ph type="sldNum" sz="quarter" idx="5"/>
+          </p:nvPr>
+        </p:nvSpPr>
+        <p:spPr/>
+        <p:txBody>
+          <a:bodyPr/>
+          <a:lstStyle/>
+          <a:p>
+            <a:fld id="{8AC3DE86-1BAE-4742-82A7-E109ACB8EC62}" type="slidenum">
+              <a:rPr kumimoji="1" lang="zh-CN" altLang="en-US" smtClean="0"/>
+              <a:t>4</a:t>
+            </a:fld>
+            <a:endParaRPr kumimoji="1" lang="zh-CN" altLang="en-US"/>
+          </a:p>
+        </p:txBody>
+      </p:sp>
+    </p:spTree>
+    <p:extLst>
+      <p:ext uri="{BB962C8B-B14F-4D97-AF65-F5344CB8AC3E}">
+        <p14:creationId xmlns:p14="http://schemas.microsoft.com/office/powerpoint/2010/main" val="2918821453"/>
+      </p:ext>
+    </p:extLst>
+  </p:cSld>
+  <p:clrMapOvr>
+    <a:masterClrMapping/>
+  </p:clrMapOvr>
+</p:notes>
+</file>
+
+<file path=ppt/notesSlides/notesSlide5.xml><?xml version="1.0" encoding="utf-8"?>
+<p:notes xmlns:a="http://schemas.openxmlformats.org/drawingml/2006/main" xmlns:r="http://schemas.openxmlformats.org/officeDocument/2006/relationships" xmlns:p="http://schemas.openxmlformats.org/presentationml/2006/main">
+  <p:cSld>
+    <p:spTree>
+      <p:nvGrpSpPr>
+        <p:cNvPr id="1" name=""/>
+        <p:cNvGrpSpPr/>
+        <p:nvPr/>
+      </p:nvGrpSpPr>
+      <p:grpSpPr>
+        <a:xfrm>
+          <a:off x="0" y="0"/>
+          <a:ext cx="0" cy="0"/>
+          <a:chOff x="0" y="0"/>
+          <a:chExt cx="0" cy="0"/>
+        </a:xfrm>
+      </p:grpSpPr>
+      <p:sp>
+        <p:nvSpPr>
+          <p:cNvPr id="2" name="幻灯片图像占位符 1"/>
+          <p:cNvSpPr>
+            <a:spLocks noGrp="1" noRot="1" noChangeAspect="1"/>
+          </p:cNvSpPr>
+          <p:nvPr>
+            <p:ph type="sldImg"/>
+          </p:nvPr>
+        </p:nvSpPr>
+        <p:spPr/>
+      </p:sp>
+      <p:sp>
+        <p:nvSpPr>
+          <p:cNvPr id="3" name="备注占位符 2"/>
+          <p:cNvSpPr>
+            <a:spLocks noGrp="1"/>
+          </p:cNvSpPr>
+          <p:nvPr>
+            <p:ph type="body" idx="1"/>
+          </p:nvPr>
+        </p:nvSpPr>
+        <p:spPr/>
+        <p:txBody>
+          <a:bodyPr/>
+          <a:lstStyle/>
+          <a:p>
+            <a:r>
+              <a:rPr lang="en-US" altLang="zh-CN" dirty="0"/>
+              <a:t>Here, we look at the impact of computer skills. Interestingly, 55.9% of callbacks were received by applicants who did not list computer skills on their resumes, compared to 44.1% who did. This suggests that other factors, like job experience or soft skills, might be more important than having computer skills for some roles. It also highlights a possible gap between the skills employers are looking for and what candidates are listing on their resumes.</a:t>
+            </a:r>
+            <a:endParaRPr kumimoji="1" lang="zh-CN" altLang="en-US" dirty="0"/>
+          </a:p>
+        </p:txBody>
+      </p:sp>
+      <p:sp>
+        <p:nvSpPr>
+          <p:cNvPr id="4" name="灯片编号占位符 3"/>
+          <p:cNvSpPr>
+            <a:spLocks noGrp="1"/>
+          </p:cNvSpPr>
+          <p:nvPr>
+            <p:ph type="sldNum" sz="quarter" idx="5"/>
+          </p:nvPr>
+        </p:nvSpPr>
+        <p:spPr/>
+        <p:txBody>
+          <a:bodyPr/>
+          <a:lstStyle/>
+          <a:p>
+            <a:fld id="{8AC3DE86-1BAE-4742-82A7-E109ACB8EC62}" type="slidenum">
+              <a:rPr kumimoji="1" lang="zh-CN" altLang="en-US" smtClean="0"/>
+              <a:t>5</a:t>
+            </a:fld>
+            <a:endParaRPr kumimoji="1" lang="zh-CN" altLang="en-US"/>
+          </a:p>
+        </p:txBody>
+      </p:sp>
+    </p:spTree>
+    <p:extLst>
+      <p:ext uri="{BB962C8B-B14F-4D97-AF65-F5344CB8AC3E}">
+        <p14:creationId xmlns:p14="http://schemas.microsoft.com/office/powerpoint/2010/main" val="60421913"/>
+      </p:ext>
+    </p:extLst>
+  </p:cSld>
+  <p:clrMapOvr>
+    <a:masterClrMapping/>
+  </p:clrMapOvr>
+</p:notes>
+</file>
+
+<file path=ppt/notesSlides/notesSlide6.xml><?xml version="1.0" encoding="utf-8"?>
+<p:notes xmlns:a="http://schemas.openxmlformats.org/drawingml/2006/main" xmlns:r="http://schemas.openxmlformats.org/officeDocument/2006/relationships" xmlns:p="http://schemas.openxmlformats.org/presentationml/2006/main">
+  <p:cSld>
+    <p:spTree>
+      <p:nvGrpSpPr>
+        <p:cNvPr id="1" name=""/>
+        <p:cNvGrpSpPr/>
+        <p:nvPr/>
+      </p:nvGrpSpPr>
+      <p:grpSpPr>
+        <a:xfrm>
+          <a:off x="0" y="0"/>
+          <a:ext cx="0" cy="0"/>
+          <a:chOff x="0" y="0"/>
+          <a:chExt cx="0" cy="0"/>
+        </a:xfrm>
+      </p:grpSpPr>
+      <p:sp>
+        <p:nvSpPr>
+          <p:cNvPr id="2" name="幻灯片图像占位符 1"/>
+          <p:cNvSpPr>
+            <a:spLocks noGrp="1" noRot="1" noChangeAspect="1"/>
+          </p:cNvSpPr>
+          <p:nvPr>
+            <p:ph type="sldImg"/>
+          </p:nvPr>
+        </p:nvSpPr>
+        <p:spPr/>
+      </p:sp>
+      <p:sp>
+        <p:nvSpPr>
+          <p:cNvPr id="3" name="备注占位符 2"/>
+          <p:cNvSpPr>
+            <a:spLocks noGrp="1"/>
+          </p:cNvSpPr>
+          <p:nvPr>
+            <p:ph type="body" idx="1"/>
+          </p:nvPr>
+        </p:nvSpPr>
+        <p:spPr/>
+        <p:txBody>
+          <a:bodyPr/>
+          <a:lstStyle/>
+          <a:p>
+            <a:r>
+              <a:rPr lang="en-US" altLang="zh-CN" dirty="0"/>
+              <a:t>Moving on to how we split the data. The dataset was divided into 60% training, 20% validation, and 20% test sets. This ensures we have enough data for training while being able to assess the model’s performance on unseen data. We also excluded some features like 'firstname' and 'job_ad_id' since they were not relevant for predicting callbacks.</a:t>
+            </a:r>
+            <a:endParaRPr kumimoji="1" lang="zh-CN" altLang="en-US" dirty="0"/>
+          </a:p>
+        </p:txBody>
+      </p:sp>
+      <p:sp>
+        <p:nvSpPr>
+          <p:cNvPr id="4" name="灯片编号占位符 3"/>
+          <p:cNvSpPr>
+            <a:spLocks noGrp="1"/>
+          </p:cNvSpPr>
+          <p:nvPr>
+            <p:ph type="sldNum" sz="quarter" idx="5"/>
+          </p:nvPr>
+        </p:nvSpPr>
+        <p:spPr/>
+        <p:txBody>
+          <a:bodyPr/>
+          <a:lstStyle/>
+          <a:p>
+            <a:fld id="{8AC3DE86-1BAE-4742-82A7-E109ACB8EC62}" type="slidenum">
+              <a:rPr kumimoji="1" lang="zh-CN" altLang="en-US" smtClean="0"/>
+              <a:t>6</a:t>
+            </a:fld>
+            <a:endParaRPr kumimoji="1" lang="zh-CN" altLang="en-US"/>
+          </a:p>
+        </p:txBody>
+      </p:sp>
+    </p:spTree>
+    <p:extLst>
+      <p:ext uri="{BB962C8B-B14F-4D97-AF65-F5344CB8AC3E}">
+        <p14:creationId xmlns:p14="http://schemas.microsoft.com/office/powerpoint/2010/main" val="4101470359"/>
+      </p:ext>
+    </p:extLst>
+  </p:cSld>
+  <p:clrMapOvr>
+    <a:masterClrMapping/>
+  </p:clrMapOvr>
+</p:notes>
+</file>
+
+<file path=ppt/notesSlides/notesSlide7.xml><?xml version="1.0" encoding="utf-8"?>
+<p:notes xmlns:a="http://schemas.openxmlformats.org/drawingml/2006/main" xmlns:r="http://schemas.openxmlformats.org/officeDocument/2006/relationships" xmlns:p="http://schemas.openxmlformats.org/presentationml/2006/main">
+  <p:cSld>
+    <p:spTree>
+      <p:nvGrpSpPr>
+        <p:cNvPr id="1" name=""/>
+        <p:cNvGrpSpPr/>
+        <p:nvPr/>
+      </p:nvGrpSpPr>
+      <p:grpSpPr>
+        <a:xfrm>
+          <a:off x="0" y="0"/>
+          <a:ext cx="0" cy="0"/>
+          <a:chOff x="0" y="0"/>
+          <a:chExt cx="0" cy="0"/>
+        </a:xfrm>
+      </p:grpSpPr>
+      <p:sp>
+        <p:nvSpPr>
+          <p:cNvPr id="2" name="幻灯片图像占位符 1"/>
+          <p:cNvSpPr>
+            <a:spLocks noGrp="1" noRot="1" noChangeAspect="1"/>
+          </p:cNvSpPr>
+          <p:nvPr>
+            <p:ph type="sldImg"/>
+          </p:nvPr>
+        </p:nvSpPr>
+        <p:spPr/>
+      </p:sp>
+      <p:sp>
+        <p:nvSpPr>
+          <p:cNvPr id="3" name="备注占位符 2"/>
+          <p:cNvSpPr>
+            <a:spLocks noGrp="1"/>
+          </p:cNvSpPr>
+          <p:nvPr>
+            <p:ph type="body" idx="1"/>
+          </p:nvPr>
+        </p:nvSpPr>
+        <p:spPr/>
+        <p:txBody>
+          <a:bodyPr/>
+          <a:lstStyle/>
+          <a:p>
+            <a:r>
+              <a:rPr lang="en-US" altLang="zh-CN" dirty="0"/>
+              <a:t>When dealing with missing values, we noticed that several columns had placeholders like 'UNK' and 'Unknown' for categorical features. To maintain consistency, we replaced all these missing values with 'unknown.' The affected columns were '</a:t>
+            </a:r>
+            <a:r>
+              <a:rPr lang="en-US" altLang="zh-CN" dirty="0" err="1"/>
+              <a:t>job_fed_contractor</a:t>
+            </a:r>
+            <a:r>
+              <a:rPr lang="en-US" altLang="zh-CN" dirty="0"/>
+              <a:t>,' '</a:t>
+            </a:r>
+            <a:r>
+              <a:rPr lang="en-US" altLang="zh-CN" dirty="0" err="1"/>
+              <a:t>job_ownership</a:t>
+            </a:r>
+            <a:r>
+              <a:rPr lang="en-US" altLang="zh-CN" dirty="0"/>
+              <a:t>,' and '</a:t>
+            </a:r>
+            <a:r>
+              <a:rPr lang="en-US" altLang="zh-CN" dirty="0" err="1"/>
+              <a:t>job_req_min_experience</a:t>
+            </a:r>
+            <a:r>
+              <a:rPr lang="en-US" altLang="zh-CN" dirty="0"/>
+              <a:t>.' After this step, we proceeded to encoding the features.</a:t>
+            </a:r>
+            <a:endParaRPr kumimoji="1" lang="zh-CN" altLang="en-US" dirty="0"/>
+          </a:p>
+        </p:txBody>
+      </p:sp>
+      <p:sp>
+        <p:nvSpPr>
+          <p:cNvPr id="4" name="灯片编号占位符 3"/>
+          <p:cNvSpPr>
+            <a:spLocks noGrp="1"/>
+          </p:cNvSpPr>
+          <p:nvPr>
+            <p:ph type="sldNum" sz="quarter" idx="5"/>
+          </p:nvPr>
+        </p:nvSpPr>
+        <p:spPr/>
+        <p:txBody>
+          <a:bodyPr/>
+          <a:lstStyle/>
+          <a:p>
+            <a:fld id="{8AC3DE86-1BAE-4742-82A7-E109ACB8EC62}" type="slidenum">
+              <a:rPr kumimoji="1" lang="zh-CN" altLang="en-US" smtClean="0"/>
+              <a:t>7</a:t>
+            </a:fld>
+            <a:endParaRPr kumimoji="1" lang="zh-CN" altLang="en-US"/>
+          </a:p>
+        </p:txBody>
+      </p:sp>
+    </p:spTree>
+    <p:extLst>
+      <p:ext uri="{BB962C8B-B14F-4D97-AF65-F5344CB8AC3E}">
+        <p14:creationId xmlns:p14="http://schemas.microsoft.com/office/powerpoint/2010/main" val="1629235746"/>
+      </p:ext>
+    </p:extLst>
+  </p:cSld>
+  <p:clrMapOvr>
+    <a:masterClrMapping/>
+  </p:clrMapOvr>
+</p:notes>
+</file>
+
+<file path=ppt/notesSlides/notesSlide8.xml><?xml version="1.0" encoding="utf-8"?>
+<p:notes xmlns:a="http://schemas.openxmlformats.org/drawingml/2006/main" xmlns:r="http://schemas.openxmlformats.org/officeDocument/2006/relationships" xmlns:p="http://schemas.openxmlformats.org/presentationml/2006/main">
+  <p:cSld>
+    <p:spTree>
+      <p:nvGrpSpPr>
+        <p:cNvPr id="1" name=""/>
+        <p:cNvGrpSpPr/>
+        <p:nvPr/>
+      </p:nvGrpSpPr>
+      <p:grpSpPr>
+        <a:xfrm>
+          <a:off x="0" y="0"/>
+          <a:ext cx="0" cy="0"/>
+          <a:chOff x="0" y="0"/>
+          <a:chExt cx="0" cy="0"/>
+        </a:xfrm>
+      </p:grpSpPr>
+      <p:sp>
+        <p:nvSpPr>
+          <p:cNvPr id="2" name="幻灯片图像占位符 1"/>
+          <p:cNvSpPr>
+            <a:spLocks noGrp="1" noRot="1" noChangeAspect="1"/>
+          </p:cNvSpPr>
+          <p:nvPr>
+            <p:ph type="sldImg"/>
+          </p:nvPr>
+        </p:nvSpPr>
+        <p:spPr/>
+      </p:sp>
+      <p:sp>
+        <p:nvSpPr>
+          <p:cNvPr id="3" name="备注占位符 2"/>
+          <p:cNvSpPr>
+            <a:spLocks noGrp="1"/>
+          </p:cNvSpPr>
+          <p:nvPr>
+            <p:ph type="body" idx="1"/>
+          </p:nvPr>
+        </p:nvSpPr>
+        <p:spPr/>
+        <p:txBody>
+          <a:bodyPr/>
+          <a:lstStyle/>
+          <a:p>
+            <a:r>
+              <a:rPr lang="en-US" altLang="zh-CN" dirty="0"/>
+              <a:t>To properly handle our categorical features, we used two encoding methods: Ordinal Encoding for features with a natural order, like years of college, and One-Hot Encoding for those without, like job ownership. This allowed us to effectively transform the categorical data into a format suitable for our machine learning models.</a:t>
+            </a:r>
             <a:endParaRPr kumimoji="1" lang="zh-CN" altLang="en-US" dirty="0"/>
           </a:p>
         </p:txBody>
@@ -652,7 +1249,7 @@
 </p:notes>
 </file>
 
-<file path=ppt/notesSlides/notesSlide3.xml><?xml version="1.0" encoding="utf-8"?>
+<file path=ppt/notesSlides/notesSlide9.xml><?xml version="1.0" encoding="utf-8"?>
 <p:notes xmlns:a="http://schemas.openxmlformats.org/drawingml/2006/main" xmlns:r="http://schemas.openxmlformats.org/officeDocument/2006/relationships" xmlns:p="http://schemas.openxmlformats.org/presentationml/2006/main">
   <p:cSld>
     <p:spTree>
@@ -714,6 +1311,10 @@
           <a:bodyPr/>
           <a:lstStyle/>
           <a:p>
+            <a:r>
+              <a:rPr lang="en-US" altLang="zh-CN" dirty="0"/>
+              <a:t>Before preprocessing, we had 27 features. After applying one-hot encoding and ordinal feature encoding transformations, the number of features expanded to 60. Our final training dataset contains 2922 data points, which provides a robust dataset to train our model.</a:t>
+            </a:r>
             <a:endParaRPr kumimoji="1" lang="zh-CN" altLang="en-US" dirty="0"/>
           </a:p>
         </p:txBody>
@@ -1261,7 +1862,7 @@
           <a:p>
             <a:fld id="{83284890-85D2-4D7B-8EF5-15A9C1DB8F42}" type="datetimeFigureOut">
               <a:rPr lang="en-US" smtClean="0"/>
-              <a:t>10/16/24</a:t>
+              <a:t>10/20/24</a:t>
             </a:fld>
             <a:endParaRPr lang="en-US"/>
           </a:p>
@@ -1441,7 +2042,7 @@
           <a:p>
             <a:fld id="{87157CC2-0FC8-4686-B024-99790E0F5162}" type="datetimeFigureOut">
               <a:rPr lang="en-US" smtClean="0"/>
-              <a:t>10/16/24</a:t>
+              <a:t>10/20/24</a:t>
             </a:fld>
             <a:endParaRPr lang="en-US"/>
           </a:p>
@@ -1621,7 +2222,7 @@
           <a:p>
             <a:fld id="{F6764DA5-CD3D-4590-A511-FCD3BC7A793E}" type="datetimeFigureOut">
               <a:rPr lang="en-US" smtClean="0"/>
-              <a:t>10/16/24</a:t>
+              <a:t>10/20/24</a:t>
             </a:fld>
             <a:endParaRPr lang="en-US"/>
           </a:p>
@@ -1791,7 +2392,7 @@
           <a:p>
             <a:fld id="{82F5661D-6934-4B32-B92C-470368BF1EC6}" type="datetimeFigureOut">
               <a:rPr lang="en-US" smtClean="0"/>
-              <a:t>10/16/24</a:t>
+              <a:t>10/20/24</a:t>
             </a:fld>
             <a:endParaRPr lang="en-US"/>
           </a:p>
@@ -2148,7 +2749,7 @@
           <a:p>
             <a:fld id="{C6F822A4-8DA6-4447-9B1F-C5DB58435268}" type="datetimeFigureOut">
               <a:rPr lang="en-US" smtClean="0"/>
-              <a:t>10/16/24</a:t>
+              <a:t>10/20/24</a:t>
             </a:fld>
             <a:endParaRPr lang="en-US" dirty="0"/>
           </a:p>
@@ -2609,7 +3210,7 @@
           <a:p>
             <a:fld id="{E548D31E-DCDA-41A7-9C67-C4B11B94D21D}" type="datetimeFigureOut">
               <a:rPr lang="en-US" smtClean="0"/>
-              <a:t>10/16/24</a:t>
+              <a:t>10/20/24</a:t>
             </a:fld>
             <a:endParaRPr lang="en-US"/>
           </a:p>
@@ -3020,7 +3621,7 @@
           <a:p>
             <a:fld id="{9B3762C0-B258-48F1-ADE6-176B4174CCDD}" type="datetimeFigureOut">
               <a:rPr lang="en-US" smtClean="0"/>
-              <a:t>10/16/24</a:t>
+              <a:t>10/20/24</a:t>
             </a:fld>
             <a:endParaRPr lang="en-US"/>
           </a:p>
@@ -3138,7 +3739,7 @@
           <a:p>
             <a:fld id="{677919A6-33EB-49BD-A62F-1FA56B9F9712}" type="datetimeFigureOut">
               <a:rPr lang="en-US" smtClean="0"/>
-              <a:t>10/16/24</a:t>
+              <a:t>10/20/24</a:t>
             </a:fld>
             <a:endParaRPr lang="en-US"/>
           </a:p>
@@ -3256,7 +3857,7 @@
           <a:p>
             <a:fld id="{CA4E7D1B-D673-4CF6-8672-009D42ABD2A0}" type="datetimeFigureOut">
               <a:rPr lang="en-US" smtClean="0"/>
-              <a:t>10/16/24</a:t>
+              <a:t>10/20/24</a:t>
             </a:fld>
             <a:endParaRPr lang="en-US"/>
           </a:p>
@@ -3614,7 +4215,7 @@
           <a:p>
             <a:fld id="{DA16AA21-1863-4931-97CB-99D0A168701B}" type="datetimeFigureOut">
               <a:rPr lang="en-US" smtClean="0"/>
-              <a:t>10/16/24</a:t>
+              <a:t>10/20/24</a:t>
             </a:fld>
             <a:endParaRPr lang="en-US"/>
           </a:p>
@@ -4121,7 +4722,7 @@
           <a:p>
             <a:fld id="{3772C379-9A7C-4C87-A116-CBE9F58B04C5}" type="datetimeFigureOut">
               <a:rPr lang="en-US" smtClean="0"/>
-              <a:t>10/16/24</a:t>
+              <a:t>10/20/24</a:t>
             </a:fld>
             <a:endParaRPr lang="en-US"/>
           </a:p>
@@ -4476,7 +5077,7 @@
           <a:p>
             <a:fld id="{8664C608-40B1-4030-A28D-5B74BC98ADCE}" type="datetimeFigureOut">
               <a:rPr lang="en-US" smtClean="0"/>
-              <a:t>10/16/24</a:t>
+              <a:t>10/20/24</a:t>
             </a:fld>
             <a:endParaRPr lang="en-US" dirty="0"/>
           </a:p>
@@ -5186,10 +5787,19 @@
         </p:spPr>
         <p:txBody>
           <a:bodyPr>
-            <a:normAutofit/>
+            <a:normAutofit fontScale="85000" lnSpcReduction="20000"/>
           </a:bodyPr>
           <a:lstStyle/>
           <a:p>
+            <a:r>
+              <a:rPr lang="en-US" altLang="zh-CN" sz="1800" b="0" i="0" u="none" strike="noStrike" dirty="0">
+                <a:solidFill>
+                  <a:srgbClr val="000000"/>
+                </a:solidFill>
+                <a:effectLst/>
+              </a:rPr>
+              <a:t>Presenter: </a:t>
+            </a:r>
             <a:r>
               <a:rPr lang="en-US" altLang="zh-CN" sz="1800" b="0" i="0" u="none" strike="noStrike" dirty="0" err="1">
                 <a:solidFill>
@@ -5226,15 +5836,46 @@
                 <a:solidFill>
                   <a:srgbClr val="000000"/>
                 </a:solidFill>
-                <a:hlinkClick r:id="rId2"/>
               </a:rPr>
-              <a:t>GitHub Repo Link</a:t>
+              <a:t>Oct 21</a:t>
+            </a:r>
+            <a:r>
+              <a:rPr lang="en-US" altLang="zh-CN" sz="1800" baseline="30000" dirty="0">
+                <a:solidFill>
+                  <a:srgbClr val="000000"/>
+                </a:solidFill>
+              </a:rPr>
+              <a:t>st</a:t>
+            </a:r>
+            <a:r>
+              <a:rPr lang="en-US" altLang="zh-CN" sz="1800" dirty="0">
+                <a:solidFill>
+                  <a:srgbClr val="000000"/>
+                </a:solidFill>
+              </a:rPr>
+              <a:t>, 2024</a:t>
             </a:r>
             <a:endParaRPr lang="en-US" altLang="zh-CN" sz="1800" b="0" i="0" u="none" strike="noStrike" dirty="0">
               <a:solidFill>
                 <a:srgbClr val="000000"/>
               </a:solidFill>
               <a:effectLst/>
+            </a:endParaRPr>
+          </a:p>
+          <a:p>
+            <a:r>
+              <a:rPr lang="en-US" altLang="zh-CN" sz="1800" dirty="0">
+                <a:solidFill>
+                  <a:srgbClr val="000000"/>
+                </a:solidFill>
+                <a:hlinkClick r:id="rId3"/>
+              </a:rPr>
+              <a:t>https://github.com/anyfruit/Key-Resume-Attributes-Impacting-Job-Callbacks.git</a:t>
+            </a:r>
+            <a:endParaRPr lang="en-US" altLang="zh-CN" sz="1800" dirty="0">
+              <a:solidFill>
+                <a:srgbClr val="000000"/>
+              </a:solidFill>
             </a:endParaRPr>
           </a:p>
         </p:txBody>
@@ -5285,14 +5926,19 @@
             <p:ph type="title"/>
           </p:nvPr>
         </p:nvSpPr>
-        <p:spPr/>
+        <p:spPr>
+          <a:xfrm>
+            <a:off x="2167128" y="1225296"/>
+            <a:ext cx="9529572" cy="3520440"/>
+          </a:xfrm>
+        </p:spPr>
         <p:txBody>
           <a:bodyPr/>
           <a:lstStyle/>
           <a:p>
             <a:r>
               <a:rPr kumimoji="1" lang="en-US" altLang="zh-CN" dirty="0"/>
-              <a:t>Q&amp;A</a:t>
+              <a:t>Thank you for listening</a:t>
             </a:r>
             <a:endParaRPr kumimoji="1" lang="zh-CN" altLang="en-US" dirty="0"/>
           </a:p>
@@ -5405,7 +6051,7 @@
         </p:nvSpPr>
         <p:spPr>
           <a:xfrm>
-            <a:off x="1374760" y="1978252"/>
+            <a:off x="1387823" y="1997651"/>
             <a:ext cx="9791049" cy="4176712"/>
           </a:xfrm>
         </p:spPr>
@@ -5425,7 +6071,7 @@
               <a:buNone/>
             </a:pPr>
             <a:r>
-              <a:rPr lang="en-US" altLang="zh-CN" sz="2000" b="1" dirty="0"/>
+              <a:rPr lang="en-US" altLang="zh-CN" b="1" dirty="0"/>
               <a:t>Problem to Solve</a:t>
             </a:r>
           </a:p>
@@ -5449,10 +6095,7 @@
               <a:rPr lang="en-US" altLang="zh-CN" sz="1600" i="1" dirty="0"/>
               <a:t>job application callback rates</a:t>
             </a:r>
-            <a:r>
-              <a:rPr lang="en-US" altLang="zh-CN" sz="1600" dirty="0"/>
-              <a:t>.</a:t>
-            </a:r>
+            <a:endParaRPr lang="en-US" altLang="zh-CN" sz="1600" dirty="0"/>
           </a:p>
           <a:p>
             <a:pPr lvl="1">
@@ -5482,7 +6125,7 @@
               <a:buNone/>
             </a:pPr>
             <a:r>
-              <a:rPr lang="en-US" altLang="zh-CN" sz="2000" b="1" dirty="0"/>
+              <a:rPr lang="en-US" altLang="zh-CN" b="1" dirty="0"/>
               <a:t>Why This is Important</a:t>
             </a:r>
           </a:p>
@@ -5495,12 +6138,8 @@
               <a:buChar char="•"/>
             </a:pPr>
             <a:r>
-              <a:rPr lang="en-US" altLang="zh-CN" sz="1600" b="1" dirty="0"/>
-              <a:t>Importance</a:t>
-            </a:r>
-            <a:r>
               <a:rPr lang="en-US" altLang="zh-CN" sz="1600" dirty="0"/>
-              <a:t>: Beneficial to help addressing bias in hiring practices.</a:t>
+              <a:t>Guiding applicants in optimizing their resumes</a:t>
             </a:r>
           </a:p>
           <a:p>
@@ -5512,47 +6151,8 @@
               <a:buChar char="•"/>
             </a:pPr>
             <a:r>
-              <a:rPr lang="en-US" altLang="zh-CN" sz="1600" b="1" dirty="0"/>
-              <a:t>Impact</a:t>
-            </a:r>
-            <a:endParaRPr lang="en-US" altLang="zh-CN" sz="1600" dirty="0"/>
-          </a:p>
-          <a:p>
-            <a:pPr lvl="2">
-              <a:lnSpc>
-                <a:spcPct val="100000"/>
-              </a:lnSpc>
-              <a:buFont typeface="Arial" panose="020B0604020202020204" pitchFamily="34" charset="0"/>
-              <a:buChar char="•"/>
-            </a:pPr>
-            <a:r>
-              <a:rPr lang="en-US" altLang="zh-CN" dirty="0"/>
-              <a:t>Improving fairness and transparency in hiring processes</a:t>
-            </a:r>
-          </a:p>
-          <a:p>
-            <a:pPr lvl="2">
-              <a:lnSpc>
-                <a:spcPct val="100000"/>
-              </a:lnSpc>
-              <a:buFont typeface="Arial" panose="020B0604020202020204" pitchFamily="34" charset="0"/>
-              <a:buChar char="•"/>
-            </a:pPr>
-            <a:r>
-              <a:rPr lang="en-US" altLang="zh-CN" dirty="0"/>
-              <a:t>Guiding applicants in optimizing their resumes</a:t>
-            </a:r>
-          </a:p>
-          <a:p>
-            <a:pPr marL="0" indent="0">
-              <a:lnSpc>
-                <a:spcPct val="100000"/>
-              </a:lnSpc>
-              <a:buNone/>
-            </a:pPr>
-            <a:r>
-              <a:rPr lang="en-US" altLang="zh-CN" b="1" dirty="0"/>
-              <a:t>Type of Problem</a:t>
+              <a:rPr lang="en-US" altLang="zh-CN" sz="1600" dirty="0"/>
+              <a:t>Beneficial to help addressing bias in hiring practices</a:t>
             </a:r>
           </a:p>
           <a:p>
@@ -5564,12 +6164,24 @@
               <a:buChar char="•"/>
             </a:pPr>
             <a:r>
-              <a:rPr lang="en-US" altLang="zh-CN" sz="1600" b="1" dirty="0"/>
-              <a:t>Problem Type</a:t>
-            </a:r>
-          </a:p>
-          <a:p>
-            <a:pPr lvl="2">
+              <a:rPr lang="en-US" altLang="zh-CN" sz="1600" dirty="0"/>
+              <a:t>Improving fairness and transparency in hiring processes</a:t>
+            </a:r>
+          </a:p>
+          <a:p>
+            <a:pPr marL="0" indent="0">
+              <a:lnSpc>
+                <a:spcPct val="100000"/>
+              </a:lnSpc>
+              <a:buNone/>
+            </a:pPr>
+            <a:r>
+              <a:rPr lang="en-US" altLang="zh-CN" sz="1800" b="1" dirty="0"/>
+              <a:t>Type of Problem</a:t>
+            </a:r>
+          </a:p>
+          <a:p>
+            <a:pPr lvl="1">
               <a:lnSpc>
                 <a:spcPct val="100000"/>
               </a:lnSpc>
@@ -5577,24 +6189,31 @@
               <a:buChar char="•"/>
             </a:pPr>
             <a:r>
-              <a:rPr lang="en-US" altLang="zh-CN" dirty="0"/>
-              <a:t>This is a </a:t>
-            </a:r>
-            <a:r>
-              <a:rPr lang="en-US" altLang="zh-CN" i="1" u="sng" dirty="0"/>
-              <a:t>binary classification</a:t>
-            </a:r>
-            <a:r>
-              <a:rPr lang="en-US" altLang="zh-CN" i="1" dirty="0"/>
-              <a:t> </a:t>
-            </a:r>
-            <a:r>
-              <a:rPr lang="en-US" altLang="zh-CN" dirty="0"/>
-              <a:t>problem</a:t>
-            </a:r>
-          </a:p>
-          <a:p>
-            <a:pPr lvl="2">
+              <a:rPr lang="en-US" altLang="zh-CN" sz="1600" i="1" u="sng" dirty="0"/>
+              <a:t>Binary classification</a:t>
+            </a:r>
+            <a:r>
+              <a:rPr lang="en-US" altLang="zh-CN" sz="1600" dirty="0"/>
+              <a:t> problem; target variable is either 1 or 0</a:t>
+            </a:r>
+          </a:p>
+          <a:p>
+            <a:pPr marL="0" lvl="2" indent="0">
+              <a:lnSpc>
+                <a:spcPct val="100000"/>
+              </a:lnSpc>
+              <a:spcBef>
+                <a:spcPts val="1200"/>
+              </a:spcBef>
+              <a:buNone/>
+            </a:pPr>
+            <a:r>
+              <a:rPr lang="en-US" altLang="zh-CN" sz="1800" b="1" dirty="0"/>
+              <a:t>Data Collection</a:t>
+            </a:r>
+          </a:p>
+          <a:p>
+            <a:pPr lvl="1">
               <a:lnSpc>
                 <a:spcPct val="100000"/>
               </a:lnSpc>
@@ -5602,24 +6221,28 @@
               <a:buChar char="•"/>
             </a:pPr>
             <a:r>
-              <a:rPr lang="en-US" altLang="zh-CN" dirty="0"/>
-              <a:t>Target variable (received callback) is either </a:t>
-            </a:r>
-            <a:r>
-              <a:rPr lang="en-US" altLang="zh-CN" b="1" dirty="0"/>
-              <a:t>1</a:t>
-            </a:r>
-            <a:r>
-              <a:rPr lang="en-US" altLang="zh-CN" dirty="0"/>
-              <a:t> (callback received) or </a:t>
-            </a:r>
-            <a:r>
-              <a:rPr lang="en-US" altLang="zh-CN" b="1" dirty="0"/>
-              <a:t>0</a:t>
-            </a:r>
-            <a:r>
-              <a:rPr lang="en-US" altLang="zh-CN" dirty="0"/>
-              <a:t> (no callback received)</a:t>
+              <a:rPr lang="en-US" altLang="zh-CN" sz="1600" dirty="0"/>
+              <a:t>Kaggle Site: </a:t>
+            </a:r>
+            <a:r>
+              <a:rPr lang="en-US" altLang="zh-CN" sz="1400" dirty="0">
+                <a:hlinkClick r:id="rId3"/>
+              </a:rPr>
+              <a:t>https://www.kaggle.com/datasets/utkarshx27/which-resume-attributes-drive-job-callbacks</a:t>
+            </a:r>
+            <a:endParaRPr lang="en-US" altLang="zh-CN" sz="1400" dirty="0"/>
+          </a:p>
+          <a:p>
+            <a:pPr lvl="1">
+              <a:lnSpc>
+                <a:spcPct val="100000"/>
+              </a:lnSpc>
+              <a:buFont typeface="Arial" panose="020B0604020202020204" pitchFamily="34" charset="0"/>
+              <a:buChar char="•"/>
+            </a:pPr>
+            <a:r>
+              <a:rPr lang="en-US" altLang="zh-CN" sz="1600" dirty="0"/>
+              <a:t>Monitored job postings in Boston and Chicago</a:t>
             </a:r>
           </a:p>
         </p:txBody>
@@ -5639,10 +6262,10 @@
           <p:nvPr/>
         </p:nvPicPr>
         <p:blipFill>
-          <a:blip r:embed="rId2">
+          <a:blip r:embed="rId4">
             <a:extLst>
               <a:ext uri="{96DAC541-7B7A-43D3-8B79-37D633B846F1}">
-                <asvg:svgBlip xmlns:asvg="http://schemas.microsoft.com/office/drawing/2016/SVG/main" r:embed="rId3"/>
+                <asvg:svgBlip xmlns:asvg="http://schemas.microsoft.com/office/drawing/2016/SVG/main" r:embed="rId5"/>
               </a:ext>
             </a:extLst>
           </a:blip>
@@ -5652,7 +6275,7 @@
         </p:blipFill>
         <p:spPr>
           <a:xfrm>
-            <a:off x="1038714" y="1999544"/>
+            <a:off x="1058149" y="2018943"/>
             <a:ext cx="355310" cy="355310"/>
           </a:xfrm>
           <a:prstGeom prst="rect">
@@ -5675,10 +6298,10 @@
           <p:nvPr/>
         </p:nvPicPr>
         <p:blipFill>
-          <a:blip r:embed="rId4">
+          <a:blip r:embed="rId6">
             <a:extLst>
               <a:ext uri="{96DAC541-7B7A-43D3-8B79-37D633B846F1}">
-                <asvg:svgBlip xmlns:asvg="http://schemas.microsoft.com/office/drawing/2016/SVG/main" r:embed="rId5"/>
+                <asvg:svgBlip xmlns:asvg="http://schemas.microsoft.com/office/drawing/2016/SVG/main" r:embed="rId7"/>
               </a:ext>
             </a:extLst>
           </a:blip>
@@ -5688,7 +6311,7 @@
         </p:blipFill>
         <p:spPr>
           <a:xfrm>
-            <a:off x="1038714" y="3149510"/>
+            <a:off x="1058149" y="3115865"/>
             <a:ext cx="355310" cy="355310"/>
           </a:xfrm>
           <a:prstGeom prst="rect">
@@ -5711,10 +6334,10 @@
           <p:nvPr/>
         </p:nvPicPr>
         <p:blipFill>
-          <a:blip r:embed="rId6">
+          <a:blip r:embed="rId8">
             <a:extLst>
               <a:ext uri="{96DAC541-7B7A-43D3-8B79-37D633B846F1}">
-                <asvg:svgBlip xmlns:asvg="http://schemas.microsoft.com/office/drawing/2016/SVG/main" r:embed="rId7"/>
+                <asvg:svgBlip xmlns:asvg="http://schemas.microsoft.com/office/drawing/2016/SVG/main" r:embed="rId9"/>
               </a:ext>
             </a:extLst>
           </a:blip>
@@ -5724,7 +6347,43 @@
         </p:blipFill>
         <p:spPr>
           <a:xfrm>
-            <a:off x="1038714" y="4893504"/>
+            <a:off x="1058149" y="4529187"/>
+            <a:ext cx="355310" cy="355310"/>
+          </a:xfrm>
+          <a:prstGeom prst="rect">
+            <a:avLst/>
+          </a:prstGeom>
+        </p:spPr>
+      </p:pic>
+      <p:pic>
+        <p:nvPicPr>
+          <p:cNvPr id="6" name="图形 5" descr="数据库 纯色填充">
+            <a:extLst>
+              <a:ext uri="{FF2B5EF4-FFF2-40B4-BE49-F238E27FC236}">
+                <a16:creationId xmlns:a16="http://schemas.microsoft.com/office/drawing/2014/main" id="{56D25367-5825-242B-3009-CEE3D73109A8}"/>
+              </a:ext>
+            </a:extLst>
+          </p:cNvPr>
+          <p:cNvPicPr>
+            <a:picLocks noChangeAspect="1"/>
+          </p:cNvPicPr>
+          <p:nvPr/>
+        </p:nvPicPr>
+        <p:blipFill>
+          <a:blip r:embed="rId10">
+            <a:extLst>
+              <a:ext uri="{96DAC541-7B7A-43D3-8B79-37D633B846F1}">
+                <asvg:svgBlip xmlns:asvg="http://schemas.microsoft.com/office/drawing/2016/SVG/main" r:embed="rId11"/>
+              </a:ext>
+            </a:extLst>
+          </a:blip>
+          <a:stretch>
+            <a:fillRect/>
+          </a:stretch>
+        </p:blipFill>
+        <p:spPr>
+          <a:xfrm>
+            <a:off x="1072004" y="5259321"/>
             <a:ext cx="355310" cy="355310"/>
           </a:xfrm>
           <a:prstGeom prst="rect">
@@ -5826,47 +6485,32 @@
               <a:buChar char="-"/>
             </a:pPr>
             <a:r>
+              <a:rPr kumimoji="1" lang="en-US" altLang="zh-CN" sz="1800" b="1" dirty="0">
+                <a:solidFill>
+                  <a:schemeClr val="tx1"/>
+                </a:solidFill>
+              </a:rPr>
+              <a:t>Significant geographic and job-specific disparities</a:t>
+            </a:r>
+            <a:endParaRPr lang="en-US" altLang="zh-CN" sz="1800" dirty="0">
+              <a:solidFill>
+                <a:schemeClr val="tx1"/>
+              </a:solidFill>
+            </a:endParaRPr>
+          </a:p>
+          <a:p>
+            <a:pPr marL="285750" indent="-285750">
+              <a:buFontTx/>
+              <a:buChar char="-"/>
+            </a:pPr>
+            <a:r>
               <a:rPr lang="en-US" altLang="zh-CN" sz="1800" dirty="0">
                 <a:solidFill>
                   <a:schemeClr val="tx1"/>
                 </a:solidFill>
               </a:rPr>
-              <a:t>Boston shows significantly higher callback rates across most job</a:t>
-            </a:r>
-          </a:p>
-          <a:p>
-            <a:pPr marL="285750" indent="-285750">
-              <a:buFontTx/>
-              <a:buChar char="-"/>
-            </a:pPr>
-            <a:r>
-              <a:rPr kumimoji="1" lang="en-US" altLang="zh-CN" sz="1800" dirty="0">
-                <a:solidFill>
-                  <a:schemeClr val="tx1"/>
-                </a:solidFill>
-              </a:rPr>
-              <a:t>Chicago outcompete Boston in </a:t>
-            </a:r>
-            <a:r>
-              <a:rPr kumimoji="1" lang="en-US" altLang="zh-CN" sz="1800" dirty="0" err="1">
-                <a:solidFill>
-                  <a:schemeClr val="tx1"/>
-                </a:solidFill>
-              </a:rPr>
-              <a:t>Sales_rep</a:t>
-            </a:r>
-            <a:endParaRPr kumimoji="1" lang="en-US" altLang="zh-CN" sz="1800" dirty="0">
-              <a:solidFill>
-                <a:schemeClr val="tx1"/>
-              </a:solidFill>
-            </a:endParaRPr>
-          </a:p>
-          <a:p>
-            <a:endParaRPr kumimoji="1" lang="zh-CN" altLang="en-US" sz="1100" dirty="0">
-              <a:solidFill>
-                <a:schemeClr val="tx1"/>
-              </a:solidFill>
-            </a:endParaRPr>
+              <a:t>Boston shows higher callback rates across most jobs</a:t>
+            </a:r>
           </a:p>
         </p:txBody>
       </p:sp>
@@ -5901,10 +6545,10 @@
       </p:sp>
       <p:pic>
         <p:nvPicPr>
-          <p:cNvPr id="9" name="图片 8">
+          <p:cNvPr id="3" name="图片 2">
             <a:extLst>
               <a:ext uri="{FF2B5EF4-FFF2-40B4-BE49-F238E27FC236}">
-                <a16:creationId xmlns:a16="http://schemas.microsoft.com/office/drawing/2014/main" id="{705F7D02-3A18-1E5C-1397-1584B6126825}"/>
+                <a16:creationId xmlns:a16="http://schemas.microsoft.com/office/drawing/2014/main" id="{341CC576-853B-0D3C-6D9F-9A6BA110AFA1}"/>
               </a:ext>
             </a:extLst>
           </p:cNvPr>
@@ -5914,21 +6558,83 @@
           <p:nvPr/>
         </p:nvPicPr>
         <p:blipFill>
-          <a:blip r:embed="rId2"/>
+          <a:blip r:embed="rId3"/>
           <a:stretch>
             <a:fillRect/>
           </a:stretch>
         </p:blipFill>
         <p:spPr>
           <a:xfrm>
-            <a:off x="1" y="331780"/>
-            <a:ext cx="8303739" cy="6253432"/>
+            <a:off x="0" y="298505"/>
+            <a:ext cx="8303740" cy="6334016"/>
           </a:xfrm>
           <a:prstGeom prst="rect">
             <a:avLst/>
           </a:prstGeom>
         </p:spPr>
       </p:pic>
+      <p:sp>
+        <p:nvSpPr>
+          <p:cNvPr id="5" name="标题 1">
+            <a:extLst>
+              <a:ext uri="{FF2B5EF4-FFF2-40B4-BE49-F238E27FC236}">
+                <a16:creationId xmlns:a16="http://schemas.microsoft.com/office/drawing/2014/main" id="{759159A4-FE9D-BD59-3DD9-FD0E314C5467}"/>
+              </a:ext>
+            </a:extLst>
+          </p:cNvPr>
+          <p:cNvSpPr txBox="1">
+            <a:spLocks/>
+          </p:cNvSpPr>
+          <p:nvPr/>
+        </p:nvSpPr>
+        <p:spPr>
+          <a:xfrm>
+            <a:off x="8549640" y="-594360"/>
+            <a:ext cx="3200400" cy="1737360"/>
+          </a:xfrm>
+          <a:prstGeom prst="rect">
+            <a:avLst/>
+          </a:prstGeom>
+        </p:spPr>
+        <p:txBody>
+          <a:bodyPr vert="horz" lIns="91440" tIns="45720" rIns="91440" bIns="45720" rtlCol="0" anchor="b">
+            <a:normAutofit/>
+          </a:bodyPr>
+          <a:lstStyle>
+            <a:lvl1pPr algn="l" defTabSz="914400" rtl="0" eaLnBrk="1" latinLnBrk="0" hangingPunct="1">
+              <a:lnSpc>
+                <a:spcPct val="90000"/>
+              </a:lnSpc>
+              <a:spcBef>
+                <a:spcPct val="0"/>
+              </a:spcBef>
+              <a:buNone/>
+              <a:defRPr sz="3200" b="1" kern="1200" cap="all" baseline="0">
+                <a:blipFill>
+                  <a:blip r:embed="rId4">
+                    <a:extLst>
+                      <a:ext uri="{28A0092B-C50C-407E-A947-70E740481C1C}">
+                        <a14:useLocalDpi xmlns:a14="http://schemas.microsoft.com/office/drawing/2010/main" val="0"/>
+                      </a:ext>
+                    </a:extLst>
+                  </a:blip>
+                  <a:tile tx="6350" ty="-127000" sx="65000" sy="64000" flip="none" algn="tl"/>
+                </a:blipFill>
+                <a:latin typeface="+mj-lt"/>
+                <a:ea typeface="+mj-ea"/>
+                <a:cs typeface="+mj-cs"/>
+              </a:defRPr>
+            </a:lvl1pPr>
+          </a:lstStyle>
+          <a:p>
+            <a:r>
+              <a:rPr lang="en-US" altLang="zh-CN" dirty="0"/>
+              <a:t>EDA</a:t>
+            </a:r>
+            <a:endParaRPr kumimoji="1" lang="zh-CN" altLang="en-US" dirty="0"/>
+          </a:p>
+        </p:txBody>
+      </p:sp>
     </p:spTree>
     <p:extLst>
       <p:ext uri="{BB962C8B-B14F-4D97-AF65-F5344CB8AC3E}">
@@ -6048,8 +6754,30 @@
         </p:nvSpPr>
         <p:spPr/>
         <p:txBody>
-          <a:bodyPr/>
-          <a:lstStyle/>
+          <a:bodyPr>
+            <a:normAutofit/>
+          </a:bodyPr>
+          <a:lstStyle/>
+          <a:p>
+            <a:pPr marL="285750" indent="-285750">
+              <a:buFontTx/>
+              <a:buChar char="-"/>
+            </a:pPr>
+            <a:r>
+              <a:rPr lang="en-US" altLang="zh-CN" sz="1800" b="1" dirty="0">
+                <a:solidFill>
+                  <a:srgbClr val="000000"/>
+                </a:solidFill>
+              </a:rPr>
+              <a:t>Unexpected trend with college experience</a:t>
+            </a:r>
+            <a:endParaRPr lang="en-US" altLang="zh-CN" sz="1800" b="0" i="0" u="none" strike="noStrike" dirty="0">
+              <a:solidFill>
+                <a:srgbClr val="000000"/>
+              </a:solidFill>
+              <a:effectLst/>
+            </a:endParaRPr>
+          </a:p>
           <a:p>
             <a:pPr marL="285750" indent="-285750">
               <a:buFontTx/>
@@ -6062,7 +6790,7 @@
                 </a:solidFill>
                 <a:effectLst/>
               </a:rPr>
-              <a:t>Candidates with 2 years of college experience have the highest callback rate</a:t>
+              <a:t>Candidates with 2 years of college experience have highest callback rate</a:t>
             </a:r>
           </a:p>
           <a:p>
@@ -6077,18 +6805,17 @@
                 </a:solidFill>
                 <a:effectLst/>
               </a:rPr>
-              <a:t>Surprisingly, those with 4 years show lower callback rates.</a:t>
-            </a:r>
-            <a:endParaRPr kumimoji="1" lang="zh-CN" altLang="en-US" dirty="0"/>
+              <a:t>Surprisingly, those with 4 years show lower callback rates</a:t>
+            </a:r>
           </a:p>
         </p:txBody>
       </p:sp>
       <p:pic>
         <p:nvPicPr>
-          <p:cNvPr id="7" name="图片 6">
+          <p:cNvPr id="5" name="图片 4">
             <a:extLst>
               <a:ext uri="{FF2B5EF4-FFF2-40B4-BE49-F238E27FC236}">
-                <a16:creationId xmlns:a16="http://schemas.microsoft.com/office/drawing/2014/main" id="{04762C09-E2C4-740B-9221-1AFCEB4C80B9}"/>
+                <a16:creationId xmlns:a16="http://schemas.microsoft.com/office/drawing/2014/main" id="{69D4E56C-1CBD-2762-A14F-7115E8A71E26}"/>
               </a:ext>
             </a:extLst>
           </p:cNvPr>
@@ -6098,21 +6825,83 @@
           <p:nvPr/>
         </p:nvPicPr>
         <p:blipFill>
-          <a:blip r:embed="rId2"/>
+          <a:blip r:embed="rId3"/>
           <a:stretch>
             <a:fillRect/>
           </a:stretch>
         </p:blipFill>
         <p:spPr>
           <a:xfrm>
-            <a:off x="1" y="973321"/>
-            <a:ext cx="8303739" cy="4911358"/>
+            <a:off x="19304" y="984738"/>
+            <a:ext cx="8265132" cy="4888523"/>
           </a:xfrm>
           <a:prstGeom prst="rect">
             <a:avLst/>
           </a:prstGeom>
         </p:spPr>
       </p:pic>
+      <p:sp>
+        <p:nvSpPr>
+          <p:cNvPr id="6" name="标题 1">
+            <a:extLst>
+              <a:ext uri="{FF2B5EF4-FFF2-40B4-BE49-F238E27FC236}">
+                <a16:creationId xmlns:a16="http://schemas.microsoft.com/office/drawing/2014/main" id="{73C0882C-A8B1-457A-8FD6-291344C01CB2}"/>
+              </a:ext>
+            </a:extLst>
+          </p:cNvPr>
+          <p:cNvSpPr txBox="1">
+            <a:spLocks/>
+          </p:cNvSpPr>
+          <p:nvPr/>
+        </p:nvSpPr>
+        <p:spPr>
+          <a:xfrm>
+            <a:off x="8549640" y="-594360"/>
+            <a:ext cx="3200400" cy="1737360"/>
+          </a:xfrm>
+          <a:prstGeom prst="rect">
+            <a:avLst/>
+          </a:prstGeom>
+        </p:spPr>
+        <p:txBody>
+          <a:bodyPr vert="horz" lIns="91440" tIns="45720" rIns="91440" bIns="45720" rtlCol="0" anchor="b">
+            <a:normAutofit/>
+          </a:bodyPr>
+          <a:lstStyle>
+            <a:lvl1pPr algn="l" defTabSz="914400" rtl="0" eaLnBrk="1" latinLnBrk="0" hangingPunct="1">
+              <a:lnSpc>
+                <a:spcPct val="90000"/>
+              </a:lnSpc>
+              <a:spcBef>
+                <a:spcPct val="0"/>
+              </a:spcBef>
+              <a:buNone/>
+              <a:defRPr sz="3200" b="1" kern="1200" cap="all" baseline="0">
+                <a:blipFill>
+                  <a:blip r:embed="rId4">
+                    <a:extLst>
+                      <a:ext uri="{28A0092B-C50C-407E-A947-70E740481C1C}">
+                        <a14:useLocalDpi xmlns:a14="http://schemas.microsoft.com/office/drawing/2010/main" val="0"/>
+                      </a:ext>
+                    </a:extLst>
+                  </a:blip>
+                  <a:tile tx="6350" ty="-127000" sx="65000" sy="64000" flip="none" algn="tl"/>
+                </a:blipFill>
+                <a:latin typeface="+mj-lt"/>
+                <a:ea typeface="+mj-ea"/>
+                <a:cs typeface="+mj-cs"/>
+              </a:defRPr>
+            </a:lvl1pPr>
+          </a:lstStyle>
+          <a:p>
+            <a:r>
+              <a:rPr lang="en-US" altLang="zh-CN" dirty="0"/>
+              <a:t>EDA</a:t>
+            </a:r>
+            <a:endParaRPr kumimoji="1" lang="zh-CN" altLang="en-US" dirty="0"/>
+          </a:p>
+        </p:txBody>
+      </p:sp>
     </p:spTree>
     <p:extLst>
       <p:ext uri="{BB962C8B-B14F-4D97-AF65-F5344CB8AC3E}">
@@ -6247,7 +7036,7 @@
                   <a:schemeClr val="tx1"/>
                 </a:solidFill>
               </a:rPr>
-              <a:t>A surprising 55.9% of callbacks are for applicants without listed computer skills</a:t>
+              <a:t>55.9% of callbacks are for applicants without listed computer skills</a:t>
             </a:r>
           </a:p>
           <a:p>
@@ -6261,7 +7050,7 @@
                   <a:schemeClr val="tx1"/>
                 </a:solidFill>
               </a:rPr>
-              <a:t>While 44.1% of callbacks are for those with computer skills.</a:t>
+              <a:t>44.1% of callbacks are for those with computer skills</a:t>
             </a:r>
             <a:endParaRPr kumimoji="1" lang="zh-CN" altLang="en-US" sz="1800" dirty="0">
               <a:solidFill>
@@ -6273,10 +7062,10 @@
       </p:sp>
       <p:pic>
         <p:nvPicPr>
-          <p:cNvPr id="5" name="图片 4">
+          <p:cNvPr id="6" name="图片 5">
             <a:extLst>
               <a:ext uri="{FF2B5EF4-FFF2-40B4-BE49-F238E27FC236}">
-                <a16:creationId xmlns:a16="http://schemas.microsoft.com/office/drawing/2014/main" id="{17BD4F98-218B-C6A9-E911-D6E01B1311F2}"/>
+                <a16:creationId xmlns:a16="http://schemas.microsoft.com/office/drawing/2014/main" id="{A3AEEBEC-4D63-FC6D-79F8-794DCD7887FB}"/>
               </a:ext>
             </a:extLst>
           </p:cNvPr>
@@ -6293,14 +7082,76 @@
         </p:blipFill>
         <p:spPr>
           <a:xfrm>
-            <a:off x="1225951" y="0"/>
-            <a:ext cx="5853275" cy="6828820"/>
+            <a:off x="857544" y="0"/>
+            <a:ext cx="6588651" cy="6857999"/>
           </a:xfrm>
           <a:prstGeom prst="rect">
             <a:avLst/>
           </a:prstGeom>
         </p:spPr>
       </p:pic>
+      <p:sp>
+        <p:nvSpPr>
+          <p:cNvPr id="7" name="标题 1">
+            <a:extLst>
+              <a:ext uri="{FF2B5EF4-FFF2-40B4-BE49-F238E27FC236}">
+                <a16:creationId xmlns:a16="http://schemas.microsoft.com/office/drawing/2014/main" id="{1C7F0CB2-B0ED-490D-2580-3BA7D32D81AD}"/>
+              </a:ext>
+            </a:extLst>
+          </p:cNvPr>
+          <p:cNvSpPr txBox="1">
+            <a:spLocks/>
+          </p:cNvSpPr>
+          <p:nvPr/>
+        </p:nvSpPr>
+        <p:spPr>
+          <a:xfrm>
+            <a:off x="8549640" y="-594360"/>
+            <a:ext cx="3200400" cy="1737360"/>
+          </a:xfrm>
+          <a:prstGeom prst="rect">
+            <a:avLst/>
+          </a:prstGeom>
+        </p:spPr>
+        <p:txBody>
+          <a:bodyPr vert="horz" lIns="91440" tIns="45720" rIns="91440" bIns="45720" rtlCol="0" anchor="b">
+            <a:normAutofit/>
+          </a:bodyPr>
+          <a:lstStyle>
+            <a:lvl1pPr algn="l" defTabSz="914400" rtl="0" eaLnBrk="1" latinLnBrk="0" hangingPunct="1">
+              <a:lnSpc>
+                <a:spcPct val="90000"/>
+              </a:lnSpc>
+              <a:spcBef>
+                <a:spcPct val="0"/>
+              </a:spcBef>
+              <a:buNone/>
+              <a:defRPr sz="3200" b="1" kern="1200" cap="all" baseline="0">
+                <a:blipFill>
+                  <a:blip r:embed="rId4">
+                    <a:extLst>
+                      <a:ext uri="{28A0092B-C50C-407E-A947-70E740481C1C}">
+                        <a14:useLocalDpi xmlns:a14="http://schemas.microsoft.com/office/drawing/2010/main" val="0"/>
+                      </a:ext>
+                    </a:extLst>
+                  </a:blip>
+                  <a:tile tx="6350" ty="-127000" sx="65000" sy="64000" flip="none" algn="tl"/>
+                </a:blipFill>
+                <a:latin typeface="+mj-lt"/>
+                <a:ea typeface="+mj-ea"/>
+                <a:cs typeface="+mj-cs"/>
+              </a:defRPr>
+            </a:lvl1pPr>
+          </a:lstStyle>
+          <a:p>
+            <a:r>
+              <a:rPr lang="en-US" altLang="zh-CN" dirty="0"/>
+              <a:t>EDA</a:t>
+            </a:r>
+            <a:endParaRPr kumimoji="1" lang="zh-CN" altLang="en-US" dirty="0"/>
+          </a:p>
+        </p:txBody>
+      </p:sp>
     </p:spTree>
     <p:extLst>
       <p:ext uri="{BB962C8B-B14F-4D97-AF65-F5344CB8AC3E}">
@@ -6434,10 +7285,10 @@
         </p:nvGrpSpPr>
         <p:grpSpPr>
           <a:xfrm>
-            <a:off x="1297134" y="2608793"/>
-            <a:ext cx="5358309" cy="2948287"/>
-            <a:chOff x="1223421" y="2276856"/>
-            <a:chExt cx="5358309" cy="2948287"/>
+            <a:off x="1297134" y="2436632"/>
+            <a:ext cx="5358309" cy="3292610"/>
+            <a:chOff x="1223421" y="1932533"/>
+            <a:chExt cx="5358309" cy="3292610"/>
           </a:xfrm>
         </p:grpSpPr>
         <p:sp>
@@ -6454,8 +7305,8 @@
           </p:nvSpPr>
           <p:spPr>
             <a:xfrm>
-              <a:off x="2942949" y="2276856"/>
-              <a:ext cx="1951590" cy="587829"/>
+              <a:off x="2942949" y="1932533"/>
+              <a:ext cx="1951590" cy="1061051"/>
             </a:xfrm>
             <a:prstGeom prst="rect">
               <a:avLst/>
@@ -6490,6 +7341,21 @@
               <a:r>
                 <a:rPr kumimoji="1" lang="en-US" altLang="zh-CN" dirty="0"/>
                 <a:t>Dataset</a:t>
+              </a:r>
+            </a:p>
+            <a:p>
+              <a:pPr algn="ctr"/>
+              <a:r>
+                <a:rPr kumimoji="1" lang="en-US" altLang="zh-CN" dirty="0"/>
+                <a:t>4870</a:t>
+              </a:r>
+              <a:r>
+                <a:rPr kumimoji="1" lang="zh-CN" altLang="en-US" dirty="0"/>
+                <a:t> </a:t>
+              </a:r>
+              <a:r>
+                <a:rPr kumimoji="1" lang="en-US" altLang="zh-CN" dirty="0"/>
+                <a:t>rows</a:t>
               </a:r>
               <a:endParaRPr kumimoji="1" lang="zh-CN" altLang="en-US" dirty="0"/>
             </a:p>
@@ -6553,6 +7419,13 @@
                 <a:rPr kumimoji="1" lang="en-US" altLang="zh-CN" dirty="0"/>
                 <a:t>60%</a:t>
               </a:r>
+            </a:p>
+            <a:p>
+              <a:pPr algn="ctr"/>
+              <a:r>
+                <a:rPr kumimoji="1" lang="en-US" altLang="zh-CN" dirty="0"/>
+                <a:t>2922 rows</a:t>
+              </a:r>
               <a:endParaRPr kumimoji="1" lang="zh-CN" altLang="en-US" dirty="0"/>
             </a:p>
           </p:txBody>
@@ -6615,6 +7488,13 @@
                 <a:rPr kumimoji="1" lang="en-US" altLang="zh-CN" dirty="0"/>
                 <a:t>20%</a:t>
               </a:r>
+            </a:p>
+            <a:p>
+              <a:pPr algn="ctr"/>
+              <a:r>
+                <a:rPr kumimoji="1" lang="en-US" altLang="zh-CN" dirty="0"/>
+                <a:t>974 rows</a:t>
+              </a:r>
               <a:endParaRPr kumimoji="1" lang="zh-CN" altLang="en-US" dirty="0"/>
             </a:p>
           </p:txBody>
@@ -6668,7 +7548,7 @@
               <a:pPr algn="ctr"/>
               <a:r>
                 <a:rPr kumimoji="1" lang="en-US" altLang="zh-CN" dirty="0"/>
-                <a:t>Training Set</a:t>
+                <a:t>Test Set</a:t>
               </a:r>
             </a:p>
             <a:p>
@@ -6676,6 +7556,13 @@
               <a:r>
                 <a:rPr kumimoji="1" lang="en-US" altLang="zh-CN" dirty="0"/>
                 <a:t>20%</a:t>
+              </a:r>
+            </a:p>
+            <a:p>
+              <a:pPr algn="ctr"/>
+              <a:r>
+                <a:rPr kumimoji="1" lang="en-US" altLang="zh-CN" dirty="0"/>
+                <a:t>974 rows</a:t>
               </a:r>
               <a:endParaRPr kumimoji="1" lang="zh-CN" altLang="en-US" dirty="0"/>
             </a:p>
@@ -7309,8 +8196,8 @@
         </p:nvSpPr>
         <p:spPr>
           <a:xfrm>
-            <a:off x="1519082" y="3414251"/>
-            <a:ext cx="5456553" cy="2736850"/>
+            <a:off x="1180412" y="3414251"/>
+            <a:ext cx="6561582" cy="2736850"/>
           </a:xfrm>
           <a:prstGeom prst="rect">
             <a:avLst/>
@@ -7364,7 +8251,7 @@
         </p:nvSpPr>
         <p:spPr>
           <a:xfrm>
-            <a:off x="8104089" y="3430227"/>
+            <a:off x="8649508" y="3414251"/>
             <a:ext cx="2343223" cy="2720874"/>
           </a:xfrm>
           <a:prstGeom prst="rect">
@@ -7419,8 +8306,8 @@
         </p:nvSpPr>
         <p:spPr>
           <a:xfrm>
-            <a:off x="1665514" y="3997440"/>
-            <a:ext cx="2937824" cy="505434"/>
+            <a:off x="1326844" y="3997440"/>
+            <a:ext cx="2653099" cy="505434"/>
           </a:xfrm>
           <a:prstGeom prst="rect">
             <a:avLst/>
@@ -7453,10 +8340,10 @@
           <a:p>
             <a:pPr algn="ctr"/>
             <a:r>
-              <a:rPr lang="en-US" altLang="zh-CN" dirty="0" err="1"/>
+              <a:rPr lang="en-US" altLang="zh-CN" sz="1600" dirty="0" err="1"/>
               <a:t>job_fed_contractor</a:t>
             </a:r>
-            <a:endParaRPr kumimoji="1" lang="zh-CN" altLang="en-US" dirty="0"/>
+            <a:endParaRPr kumimoji="1" lang="zh-CN" altLang="en-US" sz="1600" dirty="0"/>
           </a:p>
         </p:txBody>
       </p:sp>
@@ -7474,8 +8361,8 @@
         </p:nvSpPr>
         <p:spPr>
           <a:xfrm>
-            <a:off x="1665514" y="4738269"/>
-            <a:ext cx="2937824" cy="505434"/>
+            <a:off x="1326844" y="4738269"/>
+            <a:ext cx="2653099" cy="505434"/>
           </a:xfrm>
           <a:prstGeom prst="rect">
             <a:avLst/>
@@ -7508,10 +8395,10 @@
           <a:p>
             <a:pPr algn="ctr"/>
             <a:r>
-              <a:rPr lang="en-US" altLang="zh-CN" dirty="0" err="1"/>
+              <a:rPr lang="en-US" altLang="zh-CN" sz="1600" dirty="0" err="1"/>
               <a:t>job_ownership</a:t>
             </a:r>
-            <a:endParaRPr kumimoji="1" lang="zh-CN" altLang="en-US" dirty="0"/>
+            <a:endParaRPr kumimoji="1" lang="zh-CN" altLang="en-US" sz="1600" dirty="0"/>
           </a:p>
         </p:txBody>
       </p:sp>
@@ -7529,8 +8416,8 @@
         </p:nvSpPr>
         <p:spPr>
           <a:xfrm>
-            <a:off x="1665514" y="5471724"/>
-            <a:ext cx="2937824" cy="505434"/>
+            <a:off x="1326844" y="5471724"/>
+            <a:ext cx="2653099" cy="505434"/>
           </a:xfrm>
           <a:prstGeom prst="rect">
             <a:avLst/>
@@ -7563,10 +8450,10 @@
           <a:p>
             <a:pPr algn="ctr"/>
             <a:r>
-              <a:rPr lang="en-US" altLang="zh-CN" dirty="0" err="1"/>
+              <a:rPr lang="en-US" altLang="zh-CN" sz="1600" dirty="0" err="1"/>
               <a:t>job_req_min_experience</a:t>
             </a:r>
-            <a:endParaRPr kumimoji="1" lang="zh-CN" altLang="en-US" dirty="0"/>
+            <a:endParaRPr kumimoji="1" lang="zh-CN" altLang="en-US" sz="1600" dirty="0"/>
           </a:p>
         </p:txBody>
       </p:sp>
@@ -7585,10 +8472,10 @@
           <p:nvPr/>
         </p:nvPicPr>
         <p:blipFill>
-          <a:blip r:embed="rId2">
+          <a:blip r:embed="rId3">
             <a:extLst>
               <a:ext uri="{96DAC541-7B7A-43D3-8B79-37D633B846F1}">
-                <asvg:svgBlip xmlns:asvg="http://schemas.microsoft.com/office/drawing/2016/SVG/main" r:embed="rId3"/>
+                <asvg:svgBlip xmlns:asvg="http://schemas.microsoft.com/office/drawing/2016/SVG/main" r:embed="rId4"/>
               </a:ext>
             </a:extLst>
           </a:blip>
@@ -7598,7 +8485,7 @@
         </p:blipFill>
         <p:spPr>
           <a:xfrm>
-            <a:off x="7182111" y="4386996"/>
+            <a:off x="7834736" y="4383310"/>
             <a:ext cx="709917" cy="709917"/>
           </a:xfrm>
           <a:prstGeom prst="rect">
@@ -7620,7 +8507,7 @@
         </p:nvSpPr>
         <p:spPr>
           <a:xfrm>
-            <a:off x="9193793" y="3997440"/>
+            <a:off x="9739212" y="3981464"/>
             <a:ext cx="1103509" cy="505434"/>
           </a:xfrm>
           <a:prstGeom prst="rect">
@@ -7679,7 +8566,7 @@
         </p:nvSpPr>
         <p:spPr>
           <a:xfrm>
-            <a:off x="9193792" y="4738269"/>
+            <a:off x="9739211" y="4722293"/>
             <a:ext cx="1103509" cy="505434"/>
           </a:xfrm>
           <a:prstGeom prst="rect">
@@ -7738,7 +8625,7 @@
         </p:nvSpPr>
         <p:spPr>
           <a:xfrm>
-            <a:off x="9193792" y="5471724"/>
+            <a:off x="9739211" y="5455748"/>
             <a:ext cx="1103509" cy="505434"/>
           </a:xfrm>
           <a:prstGeom prst="rect">
@@ -7797,7 +8684,7 @@
         </p:nvSpPr>
         <p:spPr>
           <a:xfrm>
-            <a:off x="8241880" y="3997440"/>
+            <a:off x="8787299" y="3981464"/>
             <a:ext cx="745437" cy="505434"/>
           </a:xfrm>
           <a:prstGeom prst="rect">
@@ -7856,7 +8743,7 @@
         </p:nvSpPr>
         <p:spPr>
           <a:xfrm>
-            <a:off x="8241879" y="4738269"/>
+            <a:off x="8787298" y="4722293"/>
             <a:ext cx="745437" cy="505434"/>
           </a:xfrm>
           <a:prstGeom prst="rect">
@@ -7915,7 +8802,7 @@
         </p:nvSpPr>
         <p:spPr>
           <a:xfrm>
-            <a:off x="8241879" y="5471724"/>
+            <a:off x="8787298" y="5455748"/>
             <a:ext cx="745437" cy="505434"/>
           </a:xfrm>
           <a:prstGeom prst="rect">
@@ -7974,8 +8861,8 @@
         </p:nvSpPr>
         <p:spPr>
           <a:xfrm>
-            <a:off x="5693041" y="3997440"/>
-            <a:ext cx="1103509" cy="505434"/>
+            <a:off x="4147455" y="3997440"/>
+            <a:ext cx="1565604" cy="505434"/>
           </a:xfrm>
           <a:prstGeom prst="rect">
             <a:avLst/>
@@ -8033,8 +8920,8 @@
         </p:nvSpPr>
         <p:spPr>
           <a:xfrm>
-            <a:off x="5693040" y="4738269"/>
-            <a:ext cx="1103509" cy="505434"/>
+            <a:off x="4147455" y="4738269"/>
+            <a:ext cx="1565604" cy="505434"/>
           </a:xfrm>
           <a:prstGeom prst="rect">
             <a:avLst/>
@@ -8092,8 +8979,8 @@
         </p:nvSpPr>
         <p:spPr>
           <a:xfrm>
-            <a:off x="5693040" y="5471724"/>
-            <a:ext cx="1103509" cy="505434"/>
+            <a:off x="4147455" y="5471724"/>
+            <a:ext cx="1565604" cy="505434"/>
           </a:xfrm>
           <a:prstGeom prst="rect">
             <a:avLst/>
@@ -8151,8 +9038,8 @@
         </p:nvSpPr>
         <p:spPr>
           <a:xfrm>
-            <a:off x="4741128" y="3997440"/>
-            <a:ext cx="745437" cy="505434"/>
+            <a:off x="5891391" y="3997440"/>
+            <a:ext cx="868915" cy="505434"/>
           </a:xfrm>
           <a:prstGeom prst="rect">
             <a:avLst/>
@@ -8210,8 +9097,8 @@
         </p:nvSpPr>
         <p:spPr>
           <a:xfrm>
-            <a:off x="4741127" y="4738269"/>
-            <a:ext cx="745437" cy="505434"/>
+            <a:off x="5891391" y="4734582"/>
+            <a:ext cx="868915" cy="505434"/>
           </a:xfrm>
           <a:prstGeom prst="rect">
             <a:avLst/>
@@ -8269,8 +9156,8 @@
         </p:nvSpPr>
         <p:spPr>
           <a:xfrm>
-            <a:off x="4741127" y="5471724"/>
-            <a:ext cx="745437" cy="505434"/>
+            <a:off x="5891391" y="5471724"/>
+            <a:ext cx="868915" cy="505434"/>
           </a:xfrm>
           <a:prstGeom prst="rect">
             <a:avLst/>
@@ -8328,8 +9215,8 @@
         </p:nvSpPr>
         <p:spPr>
           <a:xfrm>
-            <a:off x="1665514" y="3558799"/>
-            <a:ext cx="2937824" cy="293914"/>
+            <a:off x="1326844" y="3558799"/>
+            <a:ext cx="2653099" cy="293914"/>
           </a:xfrm>
           <a:prstGeom prst="rect">
             <a:avLst/>
@@ -8365,14 +9252,14 @@
           <a:p>
             <a:pPr algn="ctr"/>
             <a:r>
-              <a:rPr kumimoji="1" lang="en-US" altLang="zh-CN" dirty="0">
+              <a:rPr kumimoji="1" lang="en-US" altLang="zh-CN" sz="1600" dirty="0">
                 <a:solidFill>
                   <a:schemeClr val="tx1"/>
                 </a:solidFill>
               </a:rPr>
               <a:t>Feature Name</a:t>
             </a:r>
-            <a:endParaRPr kumimoji="1" lang="zh-CN" altLang="en-US" dirty="0">
+            <a:endParaRPr kumimoji="1" lang="zh-CN" altLang="en-US" sz="1600" dirty="0">
               <a:solidFill>
                 <a:schemeClr val="tx1"/>
               </a:solidFill>
@@ -8394,7 +9281,73 @@
         </p:nvSpPr>
         <p:spPr>
           <a:xfrm>
-            <a:off x="4741127" y="3558799"/>
+            <a:off x="4147455" y="3558799"/>
+            <a:ext cx="1565604" cy="293914"/>
+          </a:xfrm>
+          <a:prstGeom prst="rect">
+            <a:avLst/>
+          </a:prstGeom>
+          <a:solidFill>
+            <a:schemeClr val="bg1">
+              <a:lumMod val="75000"/>
+            </a:schemeClr>
+          </a:solidFill>
+          <a:ln>
+            <a:noFill/>
+          </a:ln>
+        </p:spPr>
+        <p:style>
+          <a:lnRef idx="2">
+            <a:schemeClr val="accent1">
+              <a:shade val="15000"/>
+            </a:schemeClr>
+          </a:lnRef>
+          <a:fillRef idx="1">
+            <a:schemeClr val="accent1"/>
+          </a:fillRef>
+          <a:effectRef idx="0">
+            <a:schemeClr val="accent1"/>
+          </a:effectRef>
+          <a:fontRef idx="minor">
+            <a:schemeClr val="lt1"/>
+          </a:fontRef>
+        </p:style>
+        <p:txBody>
+          <a:bodyPr rtlCol="0" anchor="ctr"/>
+          <a:lstStyle/>
+          <a:p>
+            <a:pPr algn="ctr"/>
+            <a:r>
+              <a:rPr kumimoji="1" lang="en-US" altLang="zh-CN" sz="1600" dirty="0">
+                <a:solidFill>
+                  <a:schemeClr val="tx1"/>
+                </a:solidFill>
+              </a:rPr>
+              <a:t>Missing Values</a:t>
+            </a:r>
+            <a:endParaRPr kumimoji="1" lang="zh-CN" altLang="en-US" sz="1600" dirty="0">
+              <a:solidFill>
+                <a:schemeClr val="tx1"/>
+              </a:solidFill>
+            </a:endParaRPr>
+          </a:p>
+        </p:txBody>
+      </p:sp>
+      <p:sp>
+        <p:nvSpPr>
+          <p:cNvPr id="28" name="矩形 27">
+            <a:extLst>
+              <a:ext uri="{FF2B5EF4-FFF2-40B4-BE49-F238E27FC236}">
+                <a16:creationId xmlns:a16="http://schemas.microsoft.com/office/drawing/2014/main" id="{4D5345B6-CF5F-238C-A224-EB78B6720CC9}"/>
+              </a:ext>
+            </a:extLst>
+          </p:cNvPr>
+          <p:cNvSpPr/>
+          <p:nvPr/>
+        </p:nvSpPr>
+        <p:spPr>
+          <a:xfrm>
+            <a:off x="8793408" y="3543273"/>
             <a:ext cx="2055422" cy="293914"/>
           </a:xfrm>
           <a:prstGeom prst="rect">
@@ -8431,14 +9384,14 @@
           <a:p>
             <a:pPr algn="ctr"/>
             <a:r>
-              <a:rPr kumimoji="1" lang="en-US" altLang="zh-CN" dirty="0">
+              <a:rPr kumimoji="1" lang="en-US" altLang="zh-CN" sz="1600" dirty="0">
                 <a:solidFill>
                   <a:schemeClr val="tx1"/>
                 </a:solidFill>
               </a:rPr>
-              <a:t>Missing Values</a:t>
-            </a:r>
-            <a:endParaRPr kumimoji="1" lang="zh-CN" altLang="en-US" dirty="0">
+              <a:t>Renamed Values</a:t>
+            </a:r>
+            <a:endParaRPr kumimoji="1" lang="zh-CN" altLang="en-US" sz="1600" dirty="0">
               <a:solidFill>
                 <a:schemeClr val="tx1"/>
               </a:solidFill>
@@ -8446,12 +9399,48 @@
           </a:p>
         </p:txBody>
       </p:sp>
-      <p:sp>
-        <p:nvSpPr>
-          <p:cNvPr id="28" name="矩形 27">
+      <p:pic>
+        <p:nvPicPr>
+          <p:cNvPr id="30" name="图形 29" descr="文件夹搜索 纯色填充">
             <a:extLst>
               <a:ext uri="{FF2B5EF4-FFF2-40B4-BE49-F238E27FC236}">
-                <a16:creationId xmlns:a16="http://schemas.microsoft.com/office/drawing/2014/main" id="{4D5345B6-CF5F-238C-A224-EB78B6720CC9}"/>
+                <a16:creationId xmlns:a16="http://schemas.microsoft.com/office/drawing/2014/main" id="{095E3130-038C-4720-587E-BAC7C1AAE8E7}"/>
+              </a:ext>
+            </a:extLst>
+          </p:cNvPr>
+          <p:cNvPicPr>
+            <a:picLocks noChangeAspect="1"/>
+          </p:cNvPicPr>
+          <p:nvPr/>
+        </p:nvPicPr>
+        <p:blipFill>
+          <a:blip r:embed="rId5">
+            <a:extLst>
+              <a:ext uri="{96DAC541-7B7A-43D3-8B79-37D633B846F1}">
+                <asvg:svgBlip xmlns:asvg="http://schemas.microsoft.com/office/drawing/2016/SVG/main" r:embed="rId6"/>
+              </a:ext>
+            </a:extLst>
+          </a:blip>
+          <a:stretch>
+            <a:fillRect/>
+          </a:stretch>
+        </p:blipFill>
+        <p:spPr>
+          <a:xfrm>
+            <a:off x="1040940" y="1931372"/>
+            <a:ext cx="452326" cy="452326"/>
+          </a:xfrm>
+          <a:prstGeom prst="rect">
+            <a:avLst/>
+          </a:prstGeom>
+        </p:spPr>
+      </p:pic>
+      <p:sp>
+        <p:nvSpPr>
+          <p:cNvPr id="9" name="矩形 8">
+            <a:extLst>
+              <a:ext uri="{FF2B5EF4-FFF2-40B4-BE49-F238E27FC236}">
+                <a16:creationId xmlns:a16="http://schemas.microsoft.com/office/drawing/2014/main" id="{AAB51072-E736-73DA-A95B-07020501B7CE}"/>
               </a:ext>
             </a:extLst>
           </p:cNvPr>
@@ -8460,8 +9449,8 @@
         </p:nvSpPr>
         <p:spPr>
           <a:xfrm>
-            <a:off x="8247989" y="3559249"/>
-            <a:ext cx="2055422" cy="293914"/>
+            <a:off x="6973677" y="3558799"/>
+            <a:ext cx="593270" cy="293914"/>
           </a:xfrm>
           <a:prstGeom prst="rect">
             <a:avLst/>
@@ -8497,14 +9486,14 @@
           <a:p>
             <a:pPr algn="ctr"/>
             <a:r>
-              <a:rPr kumimoji="1" lang="en-US" altLang="zh-CN" dirty="0">
+              <a:rPr kumimoji="1" lang="en-US" altLang="zh-CN" sz="1600" dirty="0">
                 <a:solidFill>
                   <a:schemeClr val="tx1"/>
                 </a:solidFill>
               </a:rPr>
-              <a:t>Renamed Values</a:t>
-            </a:r>
-            <a:endParaRPr kumimoji="1" lang="zh-CN" altLang="en-US" dirty="0">
+              <a:t>%</a:t>
+            </a:r>
+            <a:endParaRPr kumimoji="1" lang="zh-CN" altLang="en-US" sz="1600" dirty="0">
               <a:solidFill>
                 <a:schemeClr val="tx1"/>
               </a:solidFill>
@@ -8512,42 +9501,249 @@
           </a:p>
         </p:txBody>
       </p:sp>
-      <p:pic>
-        <p:nvPicPr>
-          <p:cNvPr id="30" name="图形 29" descr="文件夹搜索 纯色填充">
+      <p:sp>
+        <p:nvSpPr>
+          <p:cNvPr id="10" name="矩形 9">
             <a:extLst>
               <a:ext uri="{FF2B5EF4-FFF2-40B4-BE49-F238E27FC236}">
-                <a16:creationId xmlns:a16="http://schemas.microsoft.com/office/drawing/2014/main" id="{095E3130-038C-4720-587E-BAC7C1AAE8E7}"/>
+                <a16:creationId xmlns:a16="http://schemas.microsoft.com/office/drawing/2014/main" id="{A1A17281-15A2-E2FC-B13B-B3BBA3415853}"/>
               </a:ext>
             </a:extLst>
           </p:cNvPr>
-          <p:cNvPicPr>
-            <a:picLocks noChangeAspect="1"/>
-          </p:cNvPicPr>
+          <p:cNvSpPr/>
           <p:nvPr/>
-        </p:nvPicPr>
-        <p:blipFill>
-          <a:blip r:embed="rId4">
-            <a:extLst>
-              <a:ext uri="{96DAC541-7B7A-43D3-8B79-37D633B846F1}">
-                <asvg:svgBlip xmlns:asvg="http://schemas.microsoft.com/office/drawing/2016/SVG/main" r:embed="rId5"/>
-              </a:ext>
-            </a:extLst>
-          </a:blip>
-          <a:stretch>
-            <a:fillRect/>
-          </a:stretch>
-        </p:blipFill>
+        </p:nvSpPr>
         <p:spPr>
           <a:xfrm>
-            <a:off x="1040940" y="1931372"/>
-            <a:ext cx="452326" cy="452326"/>
+            <a:off x="6973677" y="3997440"/>
+            <a:ext cx="594000" cy="505434"/>
           </a:xfrm>
           <a:prstGeom prst="rect">
             <a:avLst/>
           </a:prstGeom>
+          <a:solidFill>
+            <a:schemeClr val="accent2">
+              <a:lumMod val="40000"/>
+              <a:lumOff val="60000"/>
+            </a:schemeClr>
+          </a:solidFill>
+          <a:ln>
+            <a:noFill/>
+          </a:ln>
         </p:spPr>
-      </p:pic>
+        <p:style>
+          <a:lnRef idx="2">
+            <a:schemeClr val="accent1">
+              <a:shade val="15000"/>
+            </a:schemeClr>
+          </a:lnRef>
+          <a:fillRef idx="1">
+            <a:schemeClr val="accent1"/>
+          </a:fillRef>
+          <a:effectRef idx="0">
+            <a:schemeClr val="accent1"/>
+          </a:effectRef>
+          <a:fontRef idx="minor">
+            <a:schemeClr val="lt1"/>
+          </a:fontRef>
+        </p:style>
+        <p:txBody>
+          <a:bodyPr rtlCol="0" anchor="ctr"/>
+          <a:lstStyle/>
+          <a:p>
+            <a:pPr algn="ctr"/>
+            <a:r>
+              <a:rPr kumimoji="1" lang="en-US" altLang="zh-CN" sz="1600" dirty="0"/>
+              <a:t>36.3</a:t>
+            </a:r>
+            <a:endParaRPr kumimoji="1" lang="zh-CN" altLang="en-US" sz="1600" dirty="0"/>
+          </a:p>
+        </p:txBody>
+      </p:sp>
+      <p:sp>
+        <p:nvSpPr>
+          <p:cNvPr id="11" name="矩形 10">
+            <a:extLst>
+              <a:ext uri="{FF2B5EF4-FFF2-40B4-BE49-F238E27FC236}">
+                <a16:creationId xmlns:a16="http://schemas.microsoft.com/office/drawing/2014/main" id="{C02406D6-289F-E07C-5706-BE27EF5AC0F9}"/>
+              </a:ext>
+            </a:extLst>
+          </p:cNvPr>
+          <p:cNvSpPr/>
+          <p:nvPr/>
+        </p:nvSpPr>
+        <p:spPr>
+          <a:xfrm>
+            <a:off x="6973677" y="4734582"/>
+            <a:ext cx="594000" cy="505434"/>
+          </a:xfrm>
+          <a:prstGeom prst="rect">
+            <a:avLst/>
+          </a:prstGeom>
+          <a:solidFill>
+            <a:schemeClr val="accent2">
+              <a:lumMod val="40000"/>
+              <a:lumOff val="60000"/>
+            </a:schemeClr>
+          </a:solidFill>
+          <a:ln>
+            <a:noFill/>
+          </a:ln>
+        </p:spPr>
+        <p:style>
+          <a:lnRef idx="2">
+            <a:schemeClr val="accent1">
+              <a:shade val="15000"/>
+            </a:schemeClr>
+          </a:lnRef>
+          <a:fillRef idx="1">
+            <a:schemeClr val="accent1"/>
+          </a:fillRef>
+          <a:effectRef idx="0">
+            <a:schemeClr val="accent1"/>
+          </a:effectRef>
+          <a:fontRef idx="minor">
+            <a:schemeClr val="lt1"/>
+          </a:fontRef>
+        </p:style>
+        <p:txBody>
+          <a:bodyPr rtlCol="0" anchor="ctr"/>
+          <a:lstStyle/>
+          <a:p>
+            <a:pPr algn="ctr"/>
+            <a:r>
+              <a:rPr kumimoji="1" lang="en-US" altLang="zh-CN" sz="1600" dirty="0"/>
+              <a:t>40.9</a:t>
+            </a:r>
+            <a:endParaRPr kumimoji="1" lang="zh-CN" altLang="en-US" sz="1600" dirty="0"/>
+          </a:p>
+        </p:txBody>
+      </p:sp>
+      <p:sp>
+        <p:nvSpPr>
+          <p:cNvPr id="12" name="矩形 11">
+            <a:extLst>
+              <a:ext uri="{FF2B5EF4-FFF2-40B4-BE49-F238E27FC236}">
+                <a16:creationId xmlns:a16="http://schemas.microsoft.com/office/drawing/2014/main" id="{F535664B-1DF8-227E-71F8-C9204923F905}"/>
+              </a:ext>
+            </a:extLst>
+          </p:cNvPr>
+          <p:cNvSpPr/>
+          <p:nvPr/>
+        </p:nvSpPr>
+        <p:spPr>
+          <a:xfrm>
+            <a:off x="6973677" y="5471724"/>
+            <a:ext cx="594000" cy="505434"/>
+          </a:xfrm>
+          <a:prstGeom prst="rect">
+            <a:avLst/>
+          </a:prstGeom>
+          <a:solidFill>
+            <a:schemeClr val="accent2">
+              <a:lumMod val="40000"/>
+              <a:lumOff val="60000"/>
+            </a:schemeClr>
+          </a:solidFill>
+          <a:ln>
+            <a:noFill/>
+          </a:ln>
+        </p:spPr>
+        <p:style>
+          <a:lnRef idx="2">
+            <a:schemeClr val="accent1">
+              <a:shade val="15000"/>
+            </a:schemeClr>
+          </a:lnRef>
+          <a:fillRef idx="1">
+            <a:schemeClr val="accent1"/>
+          </a:fillRef>
+          <a:effectRef idx="0">
+            <a:schemeClr val="accent1"/>
+          </a:effectRef>
+          <a:fontRef idx="minor">
+            <a:schemeClr val="lt1"/>
+          </a:fontRef>
+        </p:style>
+        <p:txBody>
+          <a:bodyPr rtlCol="0" anchor="ctr"/>
+          <a:lstStyle/>
+          <a:p>
+            <a:pPr algn="ctr"/>
+            <a:r>
+              <a:rPr kumimoji="1" lang="en-US" altLang="zh-CN" sz="1600" dirty="0"/>
+              <a:t>56.4</a:t>
+            </a:r>
+            <a:endParaRPr kumimoji="1" lang="zh-CN" altLang="en-US" sz="1600" dirty="0"/>
+          </a:p>
+        </p:txBody>
+      </p:sp>
+      <p:sp>
+        <p:nvSpPr>
+          <p:cNvPr id="29" name="矩形 28">
+            <a:extLst>
+              <a:ext uri="{FF2B5EF4-FFF2-40B4-BE49-F238E27FC236}">
+                <a16:creationId xmlns:a16="http://schemas.microsoft.com/office/drawing/2014/main" id="{AB32DFA8-A2EB-7B24-E261-6D2835B26840}"/>
+              </a:ext>
+            </a:extLst>
+          </p:cNvPr>
+          <p:cNvSpPr/>
+          <p:nvPr/>
+        </p:nvSpPr>
+        <p:spPr>
+          <a:xfrm>
+            <a:off x="5891391" y="3558799"/>
+            <a:ext cx="868915" cy="293914"/>
+          </a:xfrm>
+          <a:prstGeom prst="rect">
+            <a:avLst/>
+          </a:prstGeom>
+          <a:solidFill>
+            <a:schemeClr val="bg1">
+              <a:lumMod val="75000"/>
+            </a:schemeClr>
+          </a:solidFill>
+          <a:ln>
+            <a:noFill/>
+          </a:ln>
+        </p:spPr>
+        <p:style>
+          <a:lnRef idx="2">
+            <a:schemeClr val="accent1">
+              <a:shade val="15000"/>
+            </a:schemeClr>
+          </a:lnRef>
+          <a:fillRef idx="1">
+            <a:schemeClr val="accent1"/>
+          </a:fillRef>
+          <a:effectRef idx="0">
+            <a:schemeClr val="accent1"/>
+          </a:effectRef>
+          <a:fontRef idx="minor">
+            <a:schemeClr val="lt1"/>
+          </a:fontRef>
+        </p:style>
+        <p:txBody>
+          <a:bodyPr rtlCol="0" anchor="ctr"/>
+          <a:lstStyle/>
+          <a:p>
+            <a:pPr algn="ctr"/>
+            <a:r>
+              <a:rPr kumimoji="1" lang="en-US" altLang="zh-CN" sz="1600" dirty="0">
+                <a:solidFill>
+                  <a:schemeClr val="tx1"/>
+                </a:solidFill>
+              </a:rPr>
+              <a:t>Count</a:t>
+            </a:r>
+            <a:endParaRPr kumimoji="1" lang="zh-CN" altLang="en-US" sz="1600" dirty="0">
+              <a:solidFill>
+                <a:schemeClr val="tx1"/>
+              </a:solidFill>
+            </a:endParaRPr>
+          </a:p>
+        </p:txBody>
+      </p:sp>
     </p:spTree>
     <p:extLst>
       <p:ext uri="{BB962C8B-B14F-4D97-AF65-F5344CB8AC3E}">
@@ -9302,7 +10498,7 @@
           <a:p>
             <a:r>
               <a:rPr kumimoji="1" lang="en-US" altLang="zh-CN" dirty="0"/>
-              <a:t>Feature ENCODING</a:t>
+              <a:t>Preprocessing</a:t>
             </a:r>
             <a:endParaRPr kumimoji="1" lang="zh-CN" altLang="en-US" dirty="0"/>
           </a:p>
@@ -9397,7 +10593,7 @@
             </a:pPr>
             <a:r>
               <a:rPr lang="en-US" altLang="zh-CN" b="1" dirty="0"/>
-              <a:t>Final Dataset</a:t>
+              <a:t>Final Training Dataset</a:t>
             </a:r>
             <a:endParaRPr lang="en-US" altLang="zh-CN" dirty="0"/>
           </a:p>

</xml_diff>